<commit_message>
Check which sllot is active.
</commit_message>
<xml_diff>
--- a/doc/CWP-Azure-PoC.pptx
+++ b/doc/CWP-Azure-PoC.pptx
@@ -7,8 +7,10 @@
   <p:sldIdLst>
     <p:sldId id="256" r:id="rId2"/>
     <p:sldId id="257" r:id="rId3"/>
-    <p:sldId id="258" r:id="rId4"/>
-    <p:sldId id="259" r:id="rId5"/>
+    <p:sldId id="261" r:id="rId4"/>
+    <p:sldId id="260" r:id="rId5"/>
+    <p:sldId id="258" r:id="rId6"/>
+    <p:sldId id="259" r:id="rId7"/>
   </p:sldIdLst>
   <p:sldSz cx="9144000" cy="6858000" type="screen4x3"/>
   <p:notesSz cx="6858000" cy="9144000"/>
@@ -291,7 +293,8 @@
           <a:p>
             <a:fld id="{CC03DA84-C30A-4D23-8368-AA33591053C2}" type="datetimeFigureOut">
               <a:rPr lang="en-GB" smtClean="0"/>
-              <a:t>07/12/2014</a:t>
+              <a:pPr/>
+              <a:t>08/12/2014</a:t>
             </a:fld>
             <a:endParaRPr lang="en-GB"/>
           </a:p>
@@ -333,6 +336,7 @@
           <a:p>
             <a:fld id="{A22BB53B-16F6-498E-870B-06AFA27061EF}" type="slidenum">
               <a:rPr lang="en-GB" smtClean="0"/>
+              <a:pPr/>
               <a:t>‹#›</a:t>
             </a:fld>
             <a:endParaRPr lang="en-GB"/>
@@ -456,7 +460,8 @@
           <a:p>
             <a:fld id="{CC03DA84-C30A-4D23-8368-AA33591053C2}" type="datetimeFigureOut">
               <a:rPr lang="en-GB" smtClean="0"/>
-              <a:t>07/12/2014</a:t>
+              <a:pPr/>
+              <a:t>08/12/2014</a:t>
             </a:fld>
             <a:endParaRPr lang="en-GB"/>
           </a:p>
@@ -498,6 +503,7 @@
           <a:p>
             <a:fld id="{A22BB53B-16F6-498E-870B-06AFA27061EF}" type="slidenum">
               <a:rPr lang="en-GB" smtClean="0"/>
+              <a:pPr/>
               <a:t>‹#›</a:t>
             </a:fld>
             <a:endParaRPr lang="en-GB"/>
@@ -631,7 +637,8 @@
           <a:p>
             <a:fld id="{CC03DA84-C30A-4D23-8368-AA33591053C2}" type="datetimeFigureOut">
               <a:rPr lang="en-GB" smtClean="0"/>
-              <a:t>07/12/2014</a:t>
+              <a:pPr/>
+              <a:t>08/12/2014</a:t>
             </a:fld>
             <a:endParaRPr lang="en-GB"/>
           </a:p>
@@ -673,6 +680,7 @@
           <a:p>
             <a:fld id="{A22BB53B-16F6-498E-870B-06AFA27061EF}" type="slidenum">
               <a:rPr lang="en-GB" smtClean="0"/>
+              <a:pPr/>
               <a:t>‹#›</a:t>
             </a:fld>
             <a:endParaRPr lang="en-GB"/>
@@ -796,7 +804,8 @@
           <a:p>
             <a:fld id="{CC03DA84-C30A-4D23-8368-AA33591053C2}" type="datetimeFigureOut">
               <a:rPr lang="en-GB" smtClean="0"/>
-              <a:t>07/12/2014</a:t>
+              <a:pPr/>
+              <a:t>08/12/2014</a:t>
             </a:fld>
             <a:endParaRPr lang="en-GB"/>
           </a:p>
@@ -838,6 +847,7 @@
           <a:p>
             <a:fld id="{A22BB53B-16F6-498E-870B-06AFA27061EF}" type="slidenum">
               <a:rPr lang="en-GB" smtClean="0"/>
+              <a:pPr/>
               <a:t>‹#›</a:t>
             </a:fld>
             <a:endParaRPr lang="en-GB"/>
@@ -1037,7 +1047,8 @@
           <a:p>
             <a:fld id="{CC03DA84-C30A-4D23-8368-AA33591053C2}" type="datetimeFigureOut">
               <a:rPr lang="en-GB" smtClean="0"/>
-              <a:t>07/12/2014</a:t>
+              <a:pPr/>
+              <a:t>08/12/2014</a:t>
             </a:fld>
             <a:endParaRPr lang="en-GB"/>
           </a:p>
@@ -1079,6 +1090,7 @@
           <a:p>
             <a:fld id="{A22BB53B-16F6-498E-870B-06AFA27061EF}" type="slidenum">
               <a:rPr lang="en-GB" smtClean="0"/>
+              <a:pPr/>
               <a:t>‹#›</a:t>
             </a:fld>
             <a:endParaRPr lang="en-GB"/>
@@ -1320,7 +1332,8 @@
           <a:p>
             <a:fld id="{CC03DA84-C30A-4D23-8368-AA33591053C2}" type="datetimeFigureOut">
               <a:rPr lang="en-GB" smtClean="0"/>
-              <a:t>07/12/2014</a:t>
+              <a:pPr/>
+              <a:t>08/12/2014</a:t>
             </a:fld>
             <a:endParaRPr lang="en-GB"/>
           </a:p>
@@ -1362,6 +1375,7 @@
           <a:p>
             <a:fld id="{A22BB53B-16F6-498E-870B-06AFA27061EF}" type="slidenum">
               <a:rPr lang="en-GB" smtClean="0"/>
+              <a:pPr/>
               <a:t>‹#›</a:t>
             </a:fld>
             <a:endParaRPr lang="en-GB"/>
@@ -1737,7 +1751,8 @@
           <a:p>
             <a:fld id="{CC03DA84-C30A-4D23-8368-AA33591053C2}" type="datetimeFigureOut">
               <a:rPr lang="en-GB" smtClean="0"/>
-              <a:t>07/12/2014</a:t>
+              <a:pPr/>
+              <a:t>08/12/2014</a:t>
             </a:fld>
             <a:endParaRPr lang="en-GB"/>
           </a:p>
@@ -1779,6 +1794,7 @@
           <a:p>
             <a:fld id="{A22BB53B-16F6-498E-870B-06AFA27061EF}" type="slidenum">
               <a:rPr lang="en-GB" smtClean="0"/>
+              <a:pPr/>
               <a:t>‹#›</a:t>
             </a:fld>
             <a:endParaRPr lang="en-GB"/>
@@ -1850,7 +1866,8 @@
           <a:p>
             <a:fld id="{CC03DA84-C30A-4D23-8368-AA33591053C2}" type="datetimeFigureOut">
               <a:rPr lang="en-GB" smtClean="0"/>
-              <a:t>07/12/2014</a:t>
+              <a:pPr/>
+              <a:t>08/12/2014</a:t>
             </a:fld>
             <a:endParaRPr lang="en-GB"/>
           </a:p>
@@ -1892,6 +1909,7 @@
           <a:p>
             <a:fld id="{A22BB53B-16F6-498E-870B-06AFA27061EF}" type="slidenum">
               <a:rPr lang="en-GB" smtClean="0"/>
+              <a:pPr/>
               <a:t>‹#›</a:t>
             </a:fld>
             <a:endParaRPr lang="en-GB"/>
@@ -1940,7 +1958,8 @@
           <a:p>
             <a:fld id="{CC03DA84-C30A-4D23-8368-AA33591053C2}" type="datetimeFigureOut">
               <a:rPr lang="en-GB" smtClean="0"/>
-              <a:t>07/12/2014</a:t>
+              <a:pPr/>
+              <a:t>08/12/2014</a:t>
             </a:fld>
             <a:endParaRPr lang="en-GB"/>
           </a:p>
@@ -1982,6 +2001,7 @@
           <a:p>
             <a:fld id="{A22BB53B-16F6-498E-870B-06AFA27061EF}" type="slidenum">
               <a:rPr lang="en-GB" smtClean="0"/>
+              <a:pPr/>
               <a:t>‹#›</a:t>
             </a:fld>
             <a:endParaRPr lang="en-GB"/>
@@ -2212,7 +2232,8 @@
           <a:p>
             <a:fld id="{CC03DA84-C30A-4D23-8368-AA33591053C2}" type="datetimeFigureOut">
               <a:rPr lang="en-GB" smtClean="0"/>
-              <a:t>07/12/2014</a:t>
+              <a:pPr/>
+              <a:t>08/12/2014</a:t>
             </a:fld>
             <a:endParaRPr lang="en-GB"/>
           </a:p>
@@ -2254,6 +2275,7 @@
           <a:p>
             <a:fld id="{A22BB53B-16F6-498E-870B-06AFA27061EF}" type="slidenum">
               <a:rPr lang="en-GB" smtClean="0"/>
+              <a:pPr/>
               <a:t>‹#›</a:t>
             </a:fld>
             <a:endParaRPr lang="en-GB"/>
@@ -2460,7 +2482,8 @@
           <a:p>
             <a:fld id="{CC03DA84-C30A-4D23-8368-AA33591053C2}" type="datetimeFigureOut">
               <a:rPr lang="en-GB" smtClean="0"/>
-              <a:t>07/12/2014</a:t>
+              <a:pPr/>
+              <a:t>08/12/2014</a:t>
             </a:fld>
             <a:endParaRPr lang="en-GB"/>
           </a:p>
@@ -2502,6 +2525,7 @@
           <a:p>
             <a:fld id="{A22BB53B-16F6-498E-870B-06AFA27061EF}" type="slidenum">
               <a:rPr lang="en-GB" smtClean="0"/>
+              <a:pPr/>
               <a:t>‹#›</a:t>
             </a:fld>
             <a:endParaRPr lang="en-GB"/>
@@ -2668,7 +2692,8 @@
           <a:p>
             <a:fld id="{CC03DA84-C30A-4D23-8368-AA33591053C2}" type="datetimeFigureOut">
               <a:rPr lang="en-GB" smtClean="0"/>
-              <a:t>07/12/2014</a:t>
+              <a:pPr/>
+              <a:t>08/12/2014</a:t>
             </a:fld>
             <a:endParaRPr lang="en-GB"/>
           </a:p>
@@ -2746,6 +2771,7 @@
           <a:p>
             <a:fld id="{A22BB53B-16F6-498E-870B-06AFA27061EF}" type="slidenum">
               <a:rPr lang="en-GB" smtClean="0"/>
+              <a:pPr/>
               <a:t>‹#›</a:t>
             </a:fld>
             <a:endParaRPr lang="en-GB"/>
@@ -3258,6 +3284,2655 @@
           <a:chExt cx="0" cy="0"/>
         </a:xfrm>
       </p:grpSpPr>
+      <p:sp>
+        <p:nvSpPr>
+          <p:cNvPr id="2" name="Title 1"/>
+          <p:cNvSpPr>
+            <a:spLocks noGrp="1"/>
+          </p:cNvSpPr>
+          <p:nvPr>
+            <p:ph type="title"/>
+          </p:nvPr>
+        </p:nvSpPr>
+        <p:spPr/>
+        <p:txBody>
+          <a:bodyPr/>
+          <a:lstStyle/>
+          <a:p>
+            <a:endParaRPr lang="en-GB" dirty="0"/>
+          </a:p>
+        </p:txBody>
+      </p:sp>
+      <p:sp>
+        <p:nvSpPr>
+          <p:cNvPr id="3" name="Content Placeholder 2"/>
+          <p:cNvSpPr>
+            <a:spLocks noGrp="1"/>
+          </p:cNvSpPr>
+          <p:nvPr>
+            <p:ph idx="1"/>
+          </p:nvPr>
+        </p:nvSpPr>
+        <p:spPr/>
+        <p:txBody>
+          <a:bodyPr/>
+          <a:lstStyle/>
+          <a:p>
+            <a:endParaRPr lang="en-GB"/>
+          </a:p>
+        </p:txBody>
+      </p:sp>
+    </p:spTree>
+  </p:cSld>
+  <p:clrMapOvr>
+    <a:masterClrMapping/>
+  </p:clrMapOvr>
+</p:sld>
+</file>
+
+<file path=ppt/slides/slide4.xml><?xml version="1.0" encoding="utf-8"?>
+<p:sld xmlns:a="http://schemas.openxmlformats.org/drawingml/2006/main" xmlns:r="http://schemas.openxmlformats.org/officeDocument/2006/relationships" xmlns:p="http://schemas.openxmlformats.org/presentationml/2006/main">
+  <p:cSld>
+    <p:spTree>
+      <p:nvGrpSpPr>
+        <p:cNvPr id="1" name=""/>
+        <p:cNvGrpSpPr/>
+        <p:nvPr/>
+      </p:nvGrpSpPr>
+      <p:grpSpPr>
+        <a:xfrm>
+          <a:off x="0" y="0"/>
+          <a:ext cx="0" cy="0"/>
+          <a:chOff x="0" y="0"/>
+          <a:chExt cx="0" cy="0"/>
+        </a:xfrm>
+      </p:grpSpPr>
+      <p:sp>
+        <p:nvSpPr>
+          <p:cNvPr id="71" name="Rectangle 70"/>
+          <p:cNvSpPr/>
+          <p:nvPr/>
+        </p:nvSpPr>
+        <p:spPr>
+          <a:xfrm>
+            <a:off x="5292080" y="2132856"/>
+            <a:ext cx="3851920" cy="3168352"/>
+          </a:xfrm>
+          <a:prstGeom prst="rect">
+            <a:avLst/>
+          </a:prstGeom>
+          <a:solidFill>
+            <a:schemeClr val="accent4">
+              <a:lumMod val="20000"/>
+              <a:lumOff val="80000"/>
+            </a:schemeClr>
+          </a:solidFill>
+          <a:ln w="9525"/>
+        </p:spPr>
+        <p:style>
+          <a:lnRef idx="2">
+            <a:schemeClr val="accent1">
+              <a:shade val="50000"/>
+            </a:schemeClr>
+          </a:lnRef>
+          <a:fillRef idx="1">
+            <a:schemeClr val="accent1"/>
+          </a:fillRef>
+          <a:effectRef idx="0">
+            <a:schemeClr val="accent1"/>
+          </a:effectRef>
+          <a:fontRef idx="minor">
+            <a:schemeClr val="lt1"/>
+          </a:fontRef>
+        </p:style>
+        <p:txBody>
+          <a:bodyPr rtlCol="0" anchor="ctr"/>
+          <a:lstStyle/>
+          <a:p>
+            <a:pPr algn="ctr"/>
+            <a:endParaRPr lang="en-GB"/>
+          </a:p>
+        </p:txBody>
+      </p:sp>
+      <p:sp>
+        <p:nvSpPr>
+          <p:cNvPr id="9" name="Freeform 8"/>
+          <p:cNvSpPr/>
+          <p:nvPr/>
+        </p:nvSpPr>
+        <p:spPr>
+          <a:xfrm>
+            <a:off x="0" y="-1"/>
+            <a:ext cx="9144000" cy="6858001"/>
+          </a:xfrm>
+          <a:custGeom>
+            <a:avLst/>
+            <a:gdLst>
+              <a:gd name="connsiteX0" fmla="*/ 0 w 3733045"/>
+              <a:gd name="connsiteY0" fmla="*/ 457200 h 3322622"/>
+              <a:gd name="connsiteX1" fmla="*/ 1231271 w 3733045"/>
+              <a:gd name="connsiteY1" fmla="*/ 58848 h 3322622"/>
+              <a:gd name="connsiteX2" fmla="*/ 2027976 w 3733045"/>
+              <a:gd name="connsiteY2" fmla="*/ 810286 h 3322622"/>
+              <a:gd name="connsiteX3" fmla="*/ 2951429 w 3733045"/>
+              <a:gd name="connsiteY3" fmla="*/ 882713 h 3322622"/>
+              <a:gd name="connsiteX4" fmla="*/ 3684760 w 3733045"/>
+              <a:gd name="connsiteY4" fmla="*/ 1788060 h 3322622"/>
+              <a:gd name="connsiteX5" fmla="*/ 3241140 w 3733045"/>
+              <a:gd name="connsiteY5" fmla="*/ 2458016 h 3322622"/>
+              <a:gd name="connsiteX6" fmla="*/ 3612332 w 3733045"/>
+              <a:gd name="connsiteY6" fmla="*/ 3073652 h 3322622"/>
+              <a:gd name="connsiteX7" fmla="*/ 3567065 w 3733045"/>
+              <a:gd name="connsiteY7" fmla="*/ 3290935 h 3322622"/>
+              <a:gd name="connsiteX8" fmla="*/ 3567065 w 3733045"/>
+              <a:gd name="connsiteY8" fmla="*/ 3263775 h 3322622"/>
+              <a:gd name="connsiteX0" fmla="*/ 0 w 3733045"/>
+              <a:gd name="connsiteY0" fmla="*/ 457200 h 3326432"/>
+              <a:gd name="connsiteX1" fmla="*/ 1231271 w 3733045"/>
+              <a:gd name="connsiteY1" fmla="*/ 58848 h 3326432"/>
+              <a:gd name="connsiteX2" fmla="*/ 2027976 w 3733045"/>
+              <a:gd name="connsiteY2" fmla="*/ 810286 h 3326432"/>
+              <a:gd name="connsiteX3" fmla="*/ 2951429 w 3733045"/>
+              <a:gd name="connsiteY3" fmla="*/ 882713 h 3326432"/>
+              <a:gd name="connsiteX4" fmla="*/ 3684760 w 3733045"/>
+              <a:gd name="connsiteY4" fmla="*/ 1788060 h 3326432"/>
+              <a:gd name="connsiteX5" fmla="*/ 3241140 w 3733045"/>
+              <a:gd name="connsiteY5" fmla="*/ 2458016 h 3326432"/>
+              <a:gd name="connsiteX6" fmla="*/ 3612332 w 3733045"/>
+              <a:gd name="connsiteY6" fmla="*/ 3073652 h 3326432"/>
+              <a:gd name="connsiteX7" fmla="*/ 3567065 w 3733045"/>
+              <a:gd name="connsiteY7" fmla="*/ 3290935 h 3326432"/>
+              <a:gd name="connsiteX8" fmla="*/ 2996877 w 3733045"/>
+              <a:gd name="connsiteY8" fmla="*/ 3286632 h 3326432"/>
+              <a:gd name="connsiteX0" fmla="*/ 0 w 3885665"/>
+              <a:gd name="connsiteY0" fmla="*/ 457200 h 3326432"/>
+              <a:gd name="connsiteX1" fmla="*/ 1231271 w 3885665"/>
+              <a:gd name="connsiteY1" fmla="*/ 58848 h 3326432"/>
+              <a:gd name="connsiteX2" fmla="*/ 2027976 w 3885665"/>
+              <a:gd name="connsiteY2" fmla="*/ 810286 h 3326432"/>
+              <a:gd name="connsiteX3" fmla="*/ 2951429 w 3885665"/>
+              <a:gd name="connsiteY3" fmla="*/ 882713 h 3326432"/>
+              <a:gd name="connsiteX4" fmla="*/ 3684760 w 3885665"/>
+              <a:gd name="connsiteY4" fmla="*/ 1788060 h 3326432"/>
+              <a:gd name="connsiteX5" fmla="*/ 3241140 w 3885665"/>
+              <a:gd name="connsiteY5" fmla="*/ 2458016 h 3326432"/>
+              <a:gd name="connsiteX6" fmla="*/ 3612332 w 3885665"/>
+              <a:gd name="connsiteY6" fmla="*/ 3073652 h 3326432"/>
+              <a:gd name="connsiteX7" fmla="*/ 3567065 w 3885665"/>
+              <a:gd name="connsiteY7" fmla="*/ 3290935 h 3326432"/>
+              <a:gd name="connsiteX8" fmla="*/ 1700733 w 3885665"/>
+              <a:gd name="connsiteY8" fmla="*/ 3286632 h 3326432"/>
+              <a:gd name="connsiteX0" fmla="*/ 0 w 3733045"/>
+              <a:gd name="connsiteY0" fmla="*/ 457200 h 3322129"/>
+              <a:gd name="connsiteX1" fmla="*/ 1231271 w 3733045"/>
+              <a:gd name="connsiteY1" fmla="*/ 58848 h 3322129"/>
+              <a:gd name="connsiteX2" fmla="*/ 2027976 w 3733045"/>
+              <a:gd name="connsiteY2" fmla="*/ 810286 h 3322129"/>
+              <a:gd name="connsiteX3" fmla="*/ 2951429 w 3733045"/>
+              <a:gd name="connsiteY3" fmla="*/ 882713 h 3322129"/>
+              <a:gd name="connsiteX4" fmla="*/ 3684760 w 3733045"/>
+              <a:gd name="connsiteY4" fmla="*/ 1788060 h 3322129"/>
+              <a:gd name="connsiteX5" fmla="*/ 3241140 w 3733045"/>
+              <a:gd name="connsiteY5" fmla="*/ 2458016 h 3322129"/>
+              <a:gd name="connsiteX6" fmla="*/ 3612332 w 3733045"/>
+              <a:gd name="connsiteY6" fmla="*/ 3073652 h 3322129"/>
+              <a:gd name="connsiteX7" fmla="*/ 3356917 w 3733045"/>
+              <a:gd name="connsiteY7" fmla="*/ 3286632 h 3322129"/>
+              <a:gd name="connsiteX8" fmla="*/ 1700733 w 3733045"/>
+              <a:gd name="connsiteY8" fmla="*/ 3286632 h 3322129"/>
+              <a:gd name="connsiteX0" fmla="*/ 0 w 3957463"/>
+              <a:gd name="connsiteY0" fmla="*/ 457200 h 3317565"/>
+              <a:gd name="connsiteX1" fmla="*/ 1231271 w 3957463"/>
+              <a:gd name="connsiteY1" fmla="*/ 58848 h 3317565"/>
+              <a:gd name="connsiteX2" fmla="*/ 2027976 w 3957463"/>
+              <a:gd name="connsiteY2" fmla="*/ 810286 h 3317565"/>
+              <a:gd name="connsiteX3" fmla="*/ 2951429 w 3957463"/>
+              <a:gd name="connsiteY3" fmla="*/ 882713 h 3317565"/>
+              <a:gd name="connsiteX4" fmla="*/ 3684760 w 3957463"/>
+              <a:gd name="connsiteY4" fmla="*/ 1788060 h 3317565"/>
+              <a:gd name="connsiteX5" fmla="*/ 3241140 w 3957463"/>
+              <a:gd name="connsiteY5" fmla="*/ 2458016 h 3317565"/>
+              <a:gd name="connsiteX6" fmla="*/ 3612332 w 3957463"/>
+              <a:gd name="connsiteY6" fmla="*/ 3073652 h 3317565"/>
+              <a:gd name="connsiteX7" fmla="*/ 3356917 w 3957463"/>
+              <a:gd name="connsiteY7" fmla="*/ 3286632 h 3317565"/>
+              <a:gd name="connsiteX8" fmla="*/ 9053 w 3957463"/>
+              <a:gd name="connsiteY8" fmla="*/ 3259249 h 3317565"/>
+              <a:gd name="connsiteX0" fmla="*/ 0 w 3957463"/>
+              <a:gd name="connsiteY0" fmla="*/ 457200 h 3290182"/>
+              <a:gd name="connsiteX1" fmla="*/ 1231271 w 3957463"/>
+              <a:gd name="connsiteY1" fmla="*/ 58848 h 3290182"/>
+              <a:gd name="connsiteX2" fmla="*/ 2027976 w 3957463"/>
+              <a:gd name="connsiteY2" fmla="*/ 810286 h 3290182"/>
+              <a:gd name="connsiteX3" fmla="*/ 2951429 w 3957463"/>
+              <a:gd name="connsiteY3" fmla="*/ 882713 h 3290182"/>
+              <a:gd name="connsiteX4" fmla="*/ 3684760 w 3957463"/>
+              <a:gd name="connsiteY4" fmla="*/ 1788060 h 3290182"/>
+              <a:gd name="connsiteX5" fmla="*/ 3241140 w 3957463"/>
+              <a:gd name="connsiteY5" fmla="*/ 2458016 h 3290182"/>
+              <a:gd name="connsiteX6" fmla="*/ 3612332 w 3957463"/>
+              <a:gd name="connsiteY6" fmla="*/ 3073652 h 3290182"/>
+              <a:gd name="connsiteX7" fmla="*/ 3356917 w 3957463"/>
+              <a:gd name="connsiteY7" fmla="*/ 3259249 h 3290182"/>
+              <a:gd name="connsiteX8" fmla="*/ 9053 w 3957463"/>
+              <a:gd name="connsiteY8" fmla="*/ 3259249 h 3290182"/>
+              <a:gd name="connsiteX0" fmla="*/ 0 w 3957463"/>
+              <a:gd name="connsiteY0" fmla="*/ 457200 h 3259249"/>
+              <a:gd name="connsiteX1" fmla="*/ 1231271 w 3957463"/>
+              <a:gd name="connsiteY1" fmla="*/ 58848 h 3259249"/>
+              <a:gd name="connsiteX2" fmla="*/ 2027976 w 3957463"/>
+              <a:gd name="connsiteY2" fmla="*/ 810286 h 3259249"/>
+              <a:gd name="connsiteX3" fmla="*/ 2951429 w 3957463"/>
+              <a:gd name="connsiteY3" fmla="*/ 882713 h 3259249"/>
+              <a:gd name="connsiteX4" fmla="*/ 3684760 w 3957463"/>
+              <a:gd name="connsiteY4" fmla="*/ 1788060 h 3259249"/>
+              <a:gd name="connsiteX5" fmla="*/ 3241140 w 3957463"/>
+              <a:gd name="connsiteY5" fmla="*/ 2458016 h 3259249"/>
+              <a:gd name="connsiteX6" fmla="*/ 3612332 w 3957463"/>
+              <a:gd name="connsiteY6" fmla="*/ 3073652 h 3259249"/>
+              <a:gd name="connsiteX7" fmla="*/ 3356917 w 3957463"/>
+              <a:gd name="connsiteY7" fmla="*/ 3259249 h 3259249"/>
+              <a:gd name="connsiteX8" fmla="*/ 9053 w 3957463"/>
+              <a:gd name="connsiteY8" fmla="*/ 3259249 h 3259249"/>
+              <a:gd name="connsiteX0" fmla="*/ 0 w 3733045"/>
+              <a:gd name="connsiteY0" fmla="*/ 457200 h 3259249"/>
+              <a:gd name="connsiteX1" fmla="*/ 1231271 w 3733045"/>
+              <a:gd name="connsiteY1" fmla="*/ 58848 h 3259249"/>
+              <a:gd name="connsiteX2" fmla="*/ 2027976 w 3733045"/>
+              <a:gd name="connsiteY2" fmla="*/ 810286 h 3259249"/>
+              <a:gd name="connsiteX3" fmla="*/ 2951429 w 3733045"/>
+              <a:gd name="connsiteY3" fmla="*/ 882713 h 3259249"/>
+              <a:gd name="connsiteX4" fmla="*/ 3684760 w 3733045"/>
+              <a:gd name="connsiteY4" fmla="*/ 1788060 h 3259249"/>
+              <a:gd name="connsiteX5" fmla="*/ 3241140 w 3733045"/>
+              <a:gd name="connsiteY5" fmla="*/ 2458016 h 3259249"/>
+              <a:gd name="connsiteX6" fmla="*/ 3612332 w 3733045"/>
+              <a:gd name="connsiteY6" fmla="*/ 3073652 h 3259249"/>
+              <a:gd name="connsiteX7" fmla="*/ 3356917 w 3733045"/>
+              <a:gd name="connsiteY7" fmla="*/ 3259249 h 3259249"/>
+              <a:gd name="connsiteX8" fmla="*/ 9053 w 3733045"/>
+              <a:gd name="connsiteY8" fmla="*/ 3259249 h 3259249"/>
+              <a:gd name="connsiteX0" fmla="*/ 0 w 6226425"/>
+              <a:gd name="connsiteY0" fmla="*/ 4122342 h 6924391"/>
+              <a:gd name="connsiteX1" fmla="*/ 6021213 w 6226425"/>
+              <a:gd name="connsiteY1" fmla="*/ 66392 h 6924391"/>
+              <a:gd name="connsiteX2" fmla="*/ 1231271 w 6226425"/>
+              <a:gd name="connsiteY2" fmla="*/ 3723990 h 6924391"/>
+              <a:gd name="connsiteX3" fmla="*/ 2027976 w 6226425"/>
+              <a:gd name="connsiteY3" fmla="*/ 4475428 h 6924391"/>
+              <a:gd name="connsiteX4" fmla="*/ 2951429 w 6226425"/>
+              <a:gd name="connsiteY4" fmla="*/ 4547855 h 6924391"/>
+              <a:gd name="connsiteX5" fmla="*/ 3684760 w 6226425"/>
+              <a:gd name="connsiteY5" fmla="*/ 5453202 h 6924391"/>
+              <a:gd name="connsiteX6" fmla="*/ 3241140 w 6226425"/>
+              <a:gd name="connsiteY6" fmla="*/ 6123158 h 6924391"/>
+              <a:gd name="connsiteX7" fmla="*/ 3612332 w 6226425"/>
+              <a:gd name="connsiteY7" fmla="*/ 6738794 h 6924391"/>
+              <a:gd name="connsiteX8" fmla="*/ 3356917 w 6226425"/>
+              <a:gd name="connsiteY8" fmla="*/ 6924391 h 6924391"/>
+              <a:gd name="connsiteX9" fmla="*/ 9053 w 6226425"/>
+              <a:gd name="connsiteY9" fmla="*/ 6924391 h 6924391"/>
+              <a:gd name="connsiteX0" fmla="*/ 0 w 6880733"/>
+              <a:gd name="connsiteY0" fmla="*/ 4328460 h 7130509"/>
+              <a:gd name="connsiteX1" fmla="*/ 6021213 w 6880733"/>
+              <a:gd name="connsiteY1" fmla="*/ 272510 h 7130509"/>
+              <a:gd name="connsiteX2" fmla="*/ 5157117 w 6880733"/>
+              <a:gd name="connsiteY2" fmla="*/ 2693398 h 7130509"/>
+              <a:gd name="connsiteX3" fmla="*/ 2027976 w 6880733"/>
+              <a:gd name="connsiteY3" fmla="*/ 4681546 h 7130509"/>
+              <a:gd name="connsiteX4" fmla="*/ 2951429 w 6880733"/>
+              <a:gd name="connsiteY4" fmla="*/ 4753973 h 7130509"/>
+              <a:gd name="connsiteX5" fmla="*/ 3684760 w 6880733"/>
+              <a:gd name="connsiteY5" fmla="*/ 5659320 h 7130509"/>
+              <a:gd name="connsiteX6" fmla="*/ 3241140 w 6880733"/>
+              <a:gd name="connsiteY6" fmla="*/ 6329276 h 7130509"/>
+              <a:gd name="connsiteX7" fmla="*/ 3612332 w 6880733"/>
+              <a:gd name="connsiteY7" fmla="*/ 6944912 h 7130509"/>
+              <a:gd name="connsiteX8" fmla="*/ 3356917 w 6880733"/>
+              <a:gd name="connsiteY8" fmla="*/ 7130509 h 7130509"/>
+              <a:gd name="connsiteX9" fmla="*/ 9053 w 6880733"/>
+              <a:gd name="connsiteY9" fmla="*/ 7130509 h 7130509"/>
+              <a:gd name="connsiteX0" fmla="*/ 0 w 6880733"/>
+              <a:gd name="connsiteY0" fmla="*/ 4328460 h 7130509"/>
+              <a:gd name="connsiteX1" fmla="*/ 6021213 w 6880733"/>
+              <a:gd name="connsiteY1" fmla="*/ 272510 h 7130509"/>
+              <a:gd name="connsiteX2" fmla="*/ 5157117 w 6880733"/>
+              <a:gd name="connsiteY2" fmla="*/ 2693398 h 7130509"/>
+              <a:gd name="connsiteX3" fmla="*/ 5445149 w 6880733"/>
+              <a:gd name="connsiteY3" fmla="*/ 3197454 h 7130509"/>
+              <a:gd name="connsiteX4" fmla="*/ 2951429 w 6880733"/>
+              <a:gd name="connsiteY4" fmla="*/ 4753973 h 7130509"/>
+              <a:gd name="connsiteX5" fmla="*/ 3684760 w 6880733"/>
+              <a:gd name="connsiteY5" fmla="*/ 5659320 h 7130509"/>
+              <a:gd name="connsiteX6" fmla="*/ 3241140 w 6880733"/>
+              <a:gd name="connsiteY6" fmla="*/ 6329276 h 7130509"/>
+              <a:gd name="connsiteX7" fmla="*/ 3612332 w 6880733"/>
+              <a:gd name="connsiteY7" fmla="*/ 6944912 h 7130509"/>
+              <a:gd name="connsiteX8" fmla="*/ 3356917 w 6880733"/>
+              <a:gd name="connsiteY8" fmla="*/ 7130509 h 7130509"/>
+              <a:gd name="connsiteX9" fmla="*/ 9053 w 6880733"/>
+              <a:gd name="connsiteY9" fmla="*/ 7130509 h 7130509"/>
+              <a:gd name="connsiteX0" fmla="*/ 0 w 6880733"/>
+              <a:gd name="connsiteY0" fmla="*/ 4328460 h 7130509"/>
+              <a:gd name="connsiteX1" fmla="*/ 6021213 w 6880733"/>
+              <a:gd name="connsiteY1" fmla="*/ 272510 h 7130509"/>
+              <a:gd name="connsiteX2" fmla="*/ 5157117 w 6880733"/>
+              <a:gd name="connsiteY2" fmla="*/ 2693398 h 7130509"/>
+              <a:gd name="connsiteX3" fmla="*/ 5445149 w 6880733"/>
+              <a:gd name="connsiteY3" fmla="*/ 3197454 h 7130509"/>
+              <a:gd name="connsiteX4" fmla="*/ 6309245 w 6880733"/>
+              <a:gd name="connsiteY4" fmla="*/ 3629502 h 7130509"/>
+              <a:gd name="connsiteX5" fmla="*/ 3684760 w 6880733"/>
+              <a:gd name="connsiteY5" fmla="*/ 5659320 h 7130509"/>
+              <a:gd name="connsiteX6" fmla="*/ 3241140 w 6880733"/>
+              <a:gd name="connsiteY6" fmla="*/ 6329276 h 7130509"/>
+              <a:gd name="connsiteX7" fmla="*/ 3612332 w 6880733"/>
+              <a:gd name="connsiteY7" fmla="*/ 6944912 h 7130509"/>
+              <a:gd name="connsiteX8" fmla="*/ 3356917 w 6880733"/>
+              <a:gd name="connsiteY8" fmla="*/ 7130509 h 7130509"/>
+              <a:gd name="connsiteX9" fmla="*/ 9053 w 6880733"/>
+              <a:gd name="connsiteY9" fmla="*/ 7130509 h 7130509"/>
+              <a:gd name="connsiteX0" fmla="*/ 0 w 6880732"/>
+              <a:gd name="connsiteY0" fmla="*/ 4460475 h 7262524"/>
+              <a:gd name="connsiteX1" fmla="*/ 6021213 w 6880732"/>
+              <a:gd name="connsiteY1" fmla="*/ 404525 h 7262524"/>
+              <a:gd name="connsiteX2" fmla="*/ 5157117 w 6880732"/>
+              <a:gd name="connsiteY2" fmla="*/ 2033325 h 7262524"/>
+              <a:gd name="connsiteX3" fmla="*/ 5445149 w 6880732"/>
+              <a:gd name="connsiteY3" fmla="*/ 3329469 h 7262524"/>
+              <a:gd name="connsiteX4" fmla="*/ 6309245 w 6880732"/>
+              <a:gd name="connsiteY4" fmla="*/ 3761517 h 7262524"/>
+              <a:gd name="connsiteX5" fmla="*/ 3684760 w 6880732"/>
+              <a:gd name="connsiteY5" fmla="*/ 5791335 h 7262524"/>
+              <a:gd name="connsiteX6" fmla="*/ 3241140 w 6880732"/>
+              <a:gd name="connsiteY6" fmla="*/ 6461291 h 7262524"/>
+              <a:gd name="connsiteX7" fmla="*/ 3612332 w 6880732"/>
+              <a:gd name="connsiteY7" fmla="*/ 7076927 h 7262524"/>
+              <a:gd name="connsiteX8" fmla="*/ 3356917 w 6880732"/>
+              <a:gd name="connsiteY8" fmla="*/ 7262524 h 7262524"/>
+              <a:gd name="connsiteX9" fmla="*/ 9053 w 6880732"/>
+              <a:gd name="connsiteY9" fmla="*/ 7262524 h 7262524"/>
+              <a:gd name="connsiteX0" fmla="*/ 0 w 7540676"/>
+              <a:gd name="connsiteY0" fmla="*/ 4460475 h 7262524"/>
+              <a:gd name="connsiteX1" fmla="*/ 6021213 w 7540676"/>
+              <a:gd name="connsiteY1" fmla="*/ 404525 h 7262524"/>
+              <a:gd name="connsiteX2" fmla="*/ 5157117 w 7540676"/>
+              <a:gd name="connsiteY2" fmla="*/ 2033325 h 7262524"/>
+              <a:gd name="connsiteX3" fmla="*/ 5445149 w 7540676"/>
+              <a:gd name="connsiteY3" fmla="*/ 3329469 h 7262524"/>
+              <a:gd name="connsiteX4" fmla="*/ 6309245 w 7540676"/>
+              <a:gd name="connsiteY4" fmla="*/ 3761517 h 7262524"/>
+              <a:gd name="connsiteX5" fmla="*/ 7029325 w 7540676"/>
+              <a:gd name="connsiteY5" fmla="*/ 3905533 h 7262524"/>
+              <a:gd name="connsiteX6" fmla="*/ 3241140 w 7540676"/>
+              <a:gd name="connsiteY6" fmla="*/ 6461291 h 7262524"/>
+              <a:gd name="connsiteX7" fmla="*/ 3612332 w 7540676"/>
+              <a:gd name="connsiteY7" fmla="*/ 7076927 h 7262524"/>
+              <a:gd name="connsiteX8" fmla="*/ 3356917 w 7540676"/>
+              <a:gd name="connsiteY8" fmla="*/ 7262524 h 7262524"/>
+              <a:gd name="connsiteX9" fmla="*/ 9053 w 7540676"/>
+              <a:gd name="connsiteY9" fmla="*/ 7262524 h 7262524"/>
+              <a:gd name="connsiteX0" fmla="*/ 0 w 8246896"/>
+              <a:gd name="connsiteY0" fmla="*/ 4460475 h 7660428"/>
+              <a:gd name="connsiteX1" fmla="*/ 6021213 w 8246896"/>
+              <a:gd name="connsiteY1" fmla="*/ 404525 h 7660428"/>
+              <a:gd name="connsiteX2" fmla="*/ 5157117 w 8246896"/>
+              <a:gd name="connsiteY2" fmla="*/ 2033325 h 7660428"/>
+              <a:gd name="connsiteX3" fmla="*/ 5445149 w 8246896"/>
+              <a:gd name="connsiteY3" fmla="*/ 3329469 h 7660428"/>
+              <a:gd name="connsiteX4" fmla="*/ 6309245 w 8246896"/>
+              <a:gd name="connsiteY4" fmla="*/ 3761517 h 7660428"/>
+              <a:gd name="connsiteX5" fmla="*/ 7029325 w 8246896"/>
+              <a:gd name="connsiteY5" fmla="*/ 3905533 h 7660428"/>
+              <a:gd name="connsiteX6" fmla="*/ 7677397 w 8246896"/>
+              <a:gd name="connsiteY6" fmla="*/ 3761517 h 7660428"/>
+              <a:gd name="connsiteX7" fmla="*/ 3612332 w 8246896"/>
+              <a:gd name="connsiteY7" fmla="*/ 7076927 h 7660428"/>
+              <a:gd name="connsiteX8" fmla="*/ 3356917 w 8246896"/>
+              <a:gd name="connsiteY8" fmla="*/ 7262524 h 7660428"/>
+              <a:gd name="connsiteX9" fmla="*/ 9053 w 8246896"/>
+              <a:gd name="connsiteY9" fmla="*/ 7262524 h 7660428"/>
+              <a:gd name="connsiteX0" fmla="*/ 0 w 8246896"/>
+              <a:gd name="connsiteY0" fmla="*/ 4460475 h 7660428"/>
+              <a:gd name="connsiteX1" fmla="*/ 6021213 w 8246896"/>
+              <a:gd name="connsiteY1" fmla="*/ 404525 h 7660428"/>
+              <a:gd name="connsiteX2" fmla="*/ 5157117 w 8246896"/>
+              <a:gd name="connsiteY2" fmla="*/ 2033325 h 7660428"/>
+              <a:gd name="connsiteX3" fmla="*/ 5445149 w 8246896"/>
+              <a:gd name="connsiteY3" fmla="*/ 3329469 h 7660428"/>
+              <a:gd name="connsiteX4" fmla="*/ 6309245 w 8246896"/>
+              <a:gd name="connsiteY4" fmla="*/ 3545493 h 7660428"/>
+              <a:gd name="connsiteX5" fmla="*/ 7029325 w 8246896"/>
+              <a:gd name="connsiteY5" fmla="*/ 3905533 h 7660428"/>
+              <a:gd name="connsiteX6" fmla="*/ 7677397 w 8246896"/>
+              <a:gd name="connsiteY6" fmla="*/ 3761517 h 7660428"/>
+              <a:gd name="connsiteX7" fmla="*/ 3612332 w 8246896"/>
+              <a:gd name="connsiteY7" fmla="*/ 7076927 h 7660428"/>
+              <a:gd name="connsiteX8" fmla="*/ 3356917 w 8246896"/>
+              <a:gd name="connsiteY8" fmla="*/ 7262524 h 7660428"/>
+              <a:gd name="connsiteX9" fmla="*/ 9053 w 8246896"/>
+              <a:gd name="connsiteY9" fmla="*/ 7262524 h 7660428"/>
+              <a:gd name="connsiteX0" fmla="*/ 0 w 9045549"/>
+              <a:gd name="connsiteY0" fmla="*/ 4460475 h 7262524"/>
+              <a:gd name="connsiteX1" fmla="*/ 6021213 w 9045549"/>
+              <a:gd name="connsiteY1" fmla="*/ 404525 h 7262524"/>
+              <a:gd name="connsiteX2" fmla="*/ 5157117 w 9045549"/>
+              <a:gd name="connsiteY2" fmla="*/ 2033325 h 7262524"/>
+              <a:gd name="connsiteX3" fmla="*/ 5445149 w 9045549"/>
+              <a:gd name="connsiteY3" fmla="*/ 3329469 h 7262524"/>
+              <a:gd name="connsiteX4" fmla="*/ 6309245 w 9045549"/>
+              <a:gd name="connsiteY4" fmla="*/ 3545493 h 7262524"/>
+              <a:gd name="connsiteX5" fmla="*/ 7029325 w 9045549"/>
+              <a:gd name="connsiteY5" fmla="*/ 3905533 h 7262524"/>
+              <a:gd name="connsiteX6" fmla="*/ 7677397 w 9045549"/>
+              <a:gd name="connsiteY6" fmla="*/ 3761517 h 7262524"/>
+              <a:gd name="connsiteX7" fmla="*/ 8325469 w 9045549"/>
+              <a:gd name="connsiteY7" fmla="*/ 3833525 h 7262524"/>
+              <a:gd name="connsiteX8" fmla="*/ 3356917 w 9045549"/>
+              <a:gd name="connsiteY8" fmla="*/ 7262524 h 7262524"/>
+              <a:gd name="connsiteX9" fmla="*/ 9053 w 9045549"/>
+              <a:gd name="connsiteY9" fmla="*/ 7262524 h 7262524"/>
+              <a:gd name="connsiteX0" fmla="*/ 0 w 9033821"/>
+              <a:gd name="connsiteY0" fmla="*/ 4460475 h 7262524"/>
+              <a:gd name="connsiteX1" fmla="*/ 6021213 w 9033821"/>
+              <a:gd name="connsiteY1" fmla="*/ 404525 h 7262524"/>
+              <a:gd name="connsiteX2" fmla="*/ 5157117 w 9033821"/>
+              <a:gd name="connsiteY2" fmla="*/ 2033325 h 7262524"/>
+              <a:gd name="connsiteX3" fmla="*/ 5445149 w 9033821"/>
+              <a:gd name="connsiteY3" fmla="*/ 3329469 h 7262524"/>
+              <a:gd name="connsiteX4" fmla="*/ 6309245 w 9033821"/>
+              <a:gd name="connsiteY4" fmla="*/ 3545493 h 7262524"/>
+              <a:gd name="connsiteX5" fmla="*/ 7029325 w 9033821"/>
+              <a:gd name="connsiteY5" fmla="*/ 3905533 h 7262524"/>
+              <a:gd name="connsiteX6" fmla="*/ 7677397 w 9033821"/>
+              <a:gd name="connsiteY6" fmla="*/ 3761517 h 7262524"/>
+              <a:gd name="connsiteX7" fmla="*/ 8325469 w 9033821"/>
+              <a:gd name="connsiteY7" fmla="*/ 3833525 h 7262524"/>
+              <a:gd name="connsiteX8" fmla="*/ 8901533 w 9033821"/>
+              <a:gd name="connsiteY8" fmla="*/ 3113445 h 7262524"/>
+              <a:gd name="connsiteX9" fmla="*/ 9053 w 9033821"/>
+              <a:gd name="connsiteY9" fmla="*/ 7262524 h 7262524"/>
+              <a:gd name="connsiteX0" fmla="*/ 0 w 9153053"/>
+              <a:gd name="connsiteY0" fmla="*/ 4460475 h 4460475"/>
+              <a:gd name="connsiteX1" fmla="*/ 6021213 w 9153053"/>
+              <a:gd name="connsiteY1" fmla="*/ 404525 h 4460475"/>
+              <a:gd name="connsiteX2" fmla="*/ 5157117 w 9153053"/>
+              <a:gd name="connsiteY2" fmla="*/ 2033325 h 4460475"/>
+              <a:gd name="connsiteX3" fmla="*/ 5445149 w 9153053"/>
+              <a:gd name="connsiteY3" fmla="*/ 3329469 h 4460475"/>
+              <a:gd name="connsiteX4" fmla="*/ 6309245 w 9153053"/>
+              <a:gd name="connsiteY4" fmla="*/ 3545493 h 4460475"/>
+              <a:gd name="connsiteX5" fmla="*/ 7029325 w 9153053"/>
+              <a:gd name="connsiteY5" fmla="*/ 3905533 h 4460475"/>
+              <a:gd name="connsiteX6" fmla="*/ 7677397 w 9153053"/>
+              <a:gd name="connsiteY6" fmla="*/ 3761517 h 4460475"/>
+              <a:gd name="connsiteX7" fmla="*/ 8325469 w 9153053"/>
+              <a:gd name="connsiteY7" fmla="*/ 3833525 h 4460475"/>
+              <a:gd name="connsiteX8" fmla="*/ 8901533 w 9153053"/>
+              <a:gd name="connsiteY8" fmla="*/ 3113445 h 4460475"/>
+              <a:gd name="connsiteX9" fmla="*/ 9153053 w 9153053"/>
+              <a:gd name="connsiteY9" fmla="*/ 2537381 h 4460475"/>
+              <a:gd name="connsiteX0" fmla="*/ 0 w 10156589"/>
+              <a:gd name="connsiteY0" fmla="*/ 4327277 h 4327278"/>
+              <a:gd name="connsiteX1" fmla="*/ 9153053 w 10156589"/>
+              <a:gd name="connsiteY1" fmla="*/ 675992 h 4327278"/>
+              <a:gd name="connsiteX2" fmla="*/ 6021213 w 10156589"/>
+              <a:gd name="connsiteY2" fmla="*/ 271327 h 4327278"/>
+              <a:gd name="connsiteX3" fmla="*/ 5157117 w 10156589"/>
+              <a:gd name="connsiteY3" fmla="*/ 1900127 h 4327278"/>
+              <a:gd name="connsiteX4" fmla="*/ 5445149 w 10156589"/>
+              <a:gd name="connsiteY4" fmla="*/ 3196271 h 4327278"/>
+              <a:gd name="connsiteX5" fmla="*/ 6309245 w 10156589"/>
+              <a:gd name="connsiteY5" fmla="*/ 3412295 h 4327278"/>
+              <a:gd name="connsiteX6" fmla="*/ 7029325 w 10156589"/>
+              <a:gd name="connsiteY6" fmla="*/ 3772335 h 4327278"/>
+              <a:gd name="connsiteX7" fmla="*/ 7677397 w 10156589"/>
+              <a:gd name="connsiteY7" fmla="*/ 3628319 h 4327278"/>
+              <a:gd name="connsiteX8" fmla="*/ 8325469 w 10156589"/>
+              <a:gd name="connsiteY8" fmla="*/ 3700327 h 4327278"/>
+              <a:gd name="connsiteX9" fmla="*/ 8901533 w 10156589"/>
+              <a:gd name="connsiteY9" fmla="*/ 2980247 h 4327278"/>
+              <a:gd name="connsiteX10" fmla="*/ 9153053 w 10156589"/>
+              <a:gd name="connsiteY10" fmla="*/ 2404183 h 4327278"/>
+              <a:gd name="connsiteX0" fmla="*/ 0 w 10678562"/>
+              <a:gd name="connsiteY0" fmla="*/ 4259973 h 4259973"/>
+              <a:gd name="connsiteX1" fmla="*/ 9153053 w 10678562"/>
+              <a:gd name="connsiteY1" fmla="*/ 896719 h 4259973"/>
+              <a:gd name="connsiteX2" fmla="*/ 9153053 w 10678562"/>
+              <a:gd name="connsiteY2" fmla="*/ 608688 h 4259973"/>
+              <a:gd name="connsiteX3" fmla="*/ 6021213 w 10678562"/>
+              <a:gd name="connsiteY3" fmla="*/ 204023 h 4259973"/>
+              <a:gd name="connsiteX4" fmla="*/ 5157117 w 10678562"/>
+              <a:gd name="connsiteY4" fmla="*/ 1832823 h 4259973"/>
+              <a:gd name="connsiteX5" fmla="*/ 5445149 w 10678562"/>
+              <a:gd name="connsiteY5" fmla="*/ 3128967 h 4259973"/>
+              <a:gd name="connsiteX6" fmla="*/ 6309245 w 10678562"/>
+              <a:gd name="connsiteY6" fmla="*/ 3344991 h 4259973"/>
+              <a:gd name="connsiteX7" fmla="*/ 7029325 w 10678562"/>
+              <a:gd name="connsiteY7" fmla="*/ 3705031 h 4259973"/>
+              <a:gd name="connsiteX8" fmla="*/ 7677397 w 10678562"/>
+              <a:gd name="connsiteY8" fmla="*/ 3561015 h 4259973"/>
+              <a:gd name="connsiteX9" fmla="*/ 8325469 w 10678562"/>
+              <a:gd name="connsiteY9" fmla="*/ 3633023 h 4259973"/>
+              <a:gd name="connsiteX10" fmla="*/ 8901533 w 10678562"/>
+              <a:gd name="connsiteY10" fmla="*/ 2912943 h 4259973"/>
+              <a:gd name="connsiteX11" fmla="*/ 9153053 w 10678562"/>
+              <a:gd name="connsiteY11" fmla="*/ 2336879 h 4259973"/>
+              <a:gd name="connsiteX0" fmla="*/ 4091947 w 5617456"/>
+              <a:gd name="connsiteY0" fmla="*/ 896719 h 3741035"/>
+              <a:gd name="connsiteX1" fmla="*/ 4091947 w 5617456"/>
+              <a:gd name="connsiteY1" fmla="*/ 608688 h 3741035"/>
+              <a:gd name="connsiteX2" fmla="*/ 960107 w 5617456"/>
+              <a:gd name="connsiteY2" fmla="*/ 204023 h 3741035"/>
+              <a:gd name="connsiteX3" fmla="*/ 96011 w 5617456"/>
+              <a:gd name="connsiteY3" fmla="*/ 1832823 h 3741035"/>
+              <a:gd name="connsiteX4" fmla="*/ 384043 w 5617456"/>
+              <a:gd name="connsiteY4" fmla="*/ 3128967 h 3741035"/>
+              <a:gd name="connsiteX5" fmla="*/ 1248139 w 5617456"/>
+              <a:gd name="connsiteY5" fmla="*/ 3344991 h 3741035"/>
+              <a:gd name="connsiteX6" fmla="*/ 1968219 w 5617456"/>
+              <a:gd name="connsiteY6" fmla="*/ 3705031 h 3741035"/>
+              <a:gd name="connsiteX7" fmla="*/ 2616291 w 5617456"/>
+              <a:gd name="connsiteY7" fmla="*/ 3561015 h 3741035"/>
+              <a:gd name="connsiteX8" fmla="*/ 3264363 w 5617456"/>
+              <a:gd name="connsiteY8" fmla="*/ 3633023 h 3741035"/>
+              <a:gd name="connsiteX9" fmla="*/ 3840427 w 5617456"/>
+              <a:gd name="connsiteY9" fmla="*/ 2912943 h 3741035"/>
+              <a:gd name="connsiteX10" fmla="*/ 4091947 w 5617456"/>
+              <a:gd name="connsiteY10" fmla="*/ 2336879 h 3741035"/>
+              <a:gd name="connsiteX0" fmla="*/ 4091946 w 5617455"/>
+              <a:gd name="connsiteY0" fmla="*/ 1256760 h 3741035"/>
+              <a:gd name="connsiteX1" fmla="*/ 4091947 w 5617455"/>
+              <a:gd name="connsiteY1" fmla="*/ 608688 h 3741035"/>
+              <a:gd name="connsiteX2" fmla="*/ 960107 w 5617455"/>
+              <a:gd name="connsiteY2" fmla="*/ 204023 h 3741035"/>
+              <a:gd name="connsiteX3" fmla="*/ 96011 w 5617455"/>
+              <a:gd name="connsiteY3" fmla="*/ 1832823 h 3741035"/>
+              <a:gd name="connsiteX4" fmla="*/ 384043 w 5617455"/>
+              <a:gd name="connsiteY4" fmla="*/ 3128967 h 3741035"/>
+              <a:gd name="connsiteX5" fmla="*/ 1248139 w 5617455"/>
+              <a:gd name="connsiteY5" fmla="*/ 3344991 h 3741035"/>
+              <a:gd name="connsiteX6" fmla="*/ 1968219 w 5617455"/>
+              <a:gd name="connsiteY6" fmla="*/ 3705031 h 3741035"/>
+              <a:gd name="connsiteX7" fmla="*/ 2616291 w 5617455"/>
+              <a:gd name="connsiteY7" fmla="*/ 3561015 h 3741035"/>
+              <a:gd name="connsiteX8" fmla="*/ 3264363 w 5617455"/>
+              <a:gd name="connsiteY8" fmla="*/ 3633023 h 3741035"/>
+              <a:gd name="connsiteX9" fmla="*/ 3840427 w 5617455"/>
+              <a:gd name="connsiteY9" fmla="*/ 2912943 h 3741035"/>
+              <a:gd name="connsiteX10" fmla="*/ 4091947 w 5617455"/>
+              <a:gd name="connsiteY10" fmla="*/ 2336879 h 3741035"/>
+              <a:gd name="connsiteX0" fmla="*/ 4091946 w 5617455"/>
+              <a:gd name="connsiteY0" fmla="*/ 1324204 h 3808479"/>
+              <a:gd name="connsiteX1" fmla="*/ 4091947 w 5617455"/>
+              <a:gd name="connsiteY1" fmla="*/ 271468 h 3808479"/>
+              <a:gd name="connsiteX2" fmla="*/ 960107 w 5617455"/>
+              <a:gd name="connsiteY2" fmla="*/ 271467 h 3808479"/>
+              <a:gd name="connsiteX3" fmla="*/ 96011 w 5617455"/>
+              <a:gd name="connsiteY3" fmla="*/ 1900267 h 3808479"/>
+              <a:gd name="connsiteX4" fmla="*/ 384043 w 5617455"/>
+              <a:gd name="connsiteY4" fmla="*/ 3196411 h 3808479"/>
+              <a:gd name="connsiteX5" fmla="*/ 1248139 w 5617455"/>
+              <a:gd name="connsiteY5" fmla="*/ 3412435 h 3808479"/>
+              <a:gd name="connsiteX6" fmla="*/ 1968219 w 5617455"/>
+              <a:gd name="connsiteY6" fmla="*/ 3772475 h 3808479"/>
+              <a:gd name="connsiteX7" fmla="*/ 2616291 w 5617455"/>
+              <a:gd name="connsiteY7" fmla="*/ 3628459 h 3808479"/>
+              <a:gd name="connsiteX8" fmla="*/ 3264363 w 5617455"/>
+              <a:gd name="connsiteY8" fmla="*/ 3700467 h 3808479"/>
+              <a:gd name="connsiteX9" fmla="*/ 3840427 w 5617455"/>
+              <a:gd name="connsiteY9" fmla="*/ 2980387 h 3808479"/>
+              <a:gd name="connsiteX10" fmla="*/ 4091947 w 5617455"/>
+              <a:gd name="connsiteY10" fmla="*/ 2404323 h 3808479"/>
+              <a:gd name="connsiteX0" fmla="*/ 4091947 w 4091947"/>
+              <a:gd name="connsiteY0" fmla="*/ 271468 h 3808479"/>
+              <a:gd name="connsiteX1" fmla="*/ 960107 w 4091947"/>
+              <a:gd name="connsiteY1" fmla="*/ 271467 h 3808479"/>
+              <a:gd name="connsiteX2" fmla="*/ 96011 w 4091947"/>
+              <a:gd name="connsiteY2" fmla="*/ 1900267 h 3808479"/>
+              <a:gd name="connsiteX3" fmla="*/ 384043 w 4091947"/>
+              <a:gd name="connsiteY3" fmla="*/ 3196411 h 3808479"/>
+              <a:gd name="connsiteX4" fmla="*/ 1248139 w 4091947"/>
+              <a:gd name="connsiteY4" fmla="*/ 3412435 h 3808479"/>
+              <a:gd name="connsiteX5" fmla="*/ 1968219 w 4091947"/>
+              <a:gd name="connsiteY5" fmla="*/ 3772475 h 3808479"/>
+              <a:gd name="connsiteX6" fmla="*/ 2616291 w 4091947"/>
+              <a:gd name="connsiteY6" fmla="*/ 3628459 h 3808479"/>
+              <a:gd name="connsiteX7" fmla="*/ 3264363 w 4091947"/>
+              <a:gd name="connsiteY7" fmla="*/ 3700467 h 3808479"/>
+              <a:gd name="connsiteX8" fmla="*/ 3840427 w 4091947"/>
+              <a:gd name="connsiteY8" fmla="*/ 2980387 h 3808479"/>
+              <a:gd name="connsiteX9" fmla="*/ 4091947 w 4091947"/>
+              <a:gd name="connsiteY9" fmla="*/ 2404323 h 3808479"/>
+              <a:gd name="connsiteX0" fmla="*/ 4091947 w 4091947"/>
+              <a:gd name="connsiteY0" fmla="*/ 175456 h 3712467"/>
+              <a:gd name="connsiteX1" fmla="*/ 960107 w 4091947"/>
+              <a:gd name="connsiteY1" fmla="*/ 175455 h 3712467"/>
+              <a:gd name="connsiteX2" fmla="*/ 96011 w 4091947"/>
+              <a:gd name="connsiteY2" fmla="*/ 1804255 h 3712467"/>
+              <a:gd name="connsiteX3" fmla="*/ 384043 w 4091947"/>
+              <a:gd name="connsiteY3" fmla="*/ 3100399 h 3712467"/>
+              <a:gd name="connsiteX4" fmla="*/ 1248139 w 4091947"/>
+              <a:gd name="connsiteY4" fmla="*/ 3316423 h 3712467"/>
+              <a:gd name="connsiteX5" fmla="*/ 1968219 w 4091947"/>
+              <a:gd name="connsiteY5" fmla="*/ 3676463 h 3712467"/>
+              <a:gd name="connsiteX6" fmla="*/ 2616291 w 4091947"/>
+              <a:gd name="connsiteY6" fmla="*/ 3532447 h 3712467"/>
+              <a:gd name="connsiteX7" fmla="*/ 3264363 w 4091947"/>
+              <a:gd name="connsiteY7" fmla="*/ 3604455 h 3712467"/>
+              <a:gd name="connsiteX8" fmla="*/ 3840427 w 4091947"/>
+              <a:gd name="connsiteY8" fmla="*/ 2884375 h 3712467"/>
+              <a:gd name="connsiteX9" fmla="*/ 4091947 w 4091947"/>
+              <a:gd name="connsiteY9" fmla="*/ 2308311 h 3712467"/>
+              <a:gd name="connsiteX0" fmla="*/ 9809989 w 9809989"/>
+              <a:gd name="connsiteY0" fmla="*/ 175456 h 3712467"/>
+              <a:gd name="connsiteX1" fmla="*/ 665989 w 9809989"/>
+              <a:gd name="connsiteY1" fmla="*/ 175456 h 3712467"/>
+              <a:gd name="connsiteX2" fmla="*/ 5814053 w 9809989"/>
+              <a:gd name="connsiteY2" fmla="*/ 1804255 h 3712467"/>
+              <a:gd name="connsiteX3" fmla="*/ 6102085 w 9809989"/>
+              <a:gd name="connsiteY3" fmla="*/ 3100399 h 3712467"/>
+              <a:gd name="connsiteX4" fmla="*/ 6966181 w 9809989"/>
+              <a:gd name="connsiteY4" fmla="*/ 3316423 h 3712467"/>
+              <a:gd name="connsiteX5" fmla="*/ 7686261 w 9809989"/>
+              <a:gd name="connsiteY5" fmla="*/ 3676463 h 3712467"/>
+              <a:gd name="connsiteX6" fmla="*/ 8334333 w 9809989"/>
+              <a:gd name="connsiteY6" fmla="*/ 3532447 h 3712467"/>
+              <a:gd name="connsiteX7" fmla="*/ 8982405 w 9809989"/>
+              <a:gd name="connsiteY7" fmla="*/ 3604455 h 3712467"/>
+              <a:gd name="connsiteX8" fmla="*/ 9558469 w 9809989"/>
+              <a:gd name="connsiteY8" fmla="*/ 2884375 h 3712467"/>
+              <a:gd name="connsiteX9" fmla="*/ 9809989 w 9809989"/>
+              <a:gd name="connsiteY9" fmla="*/ 2308311 h 3712467"/>
+              <a:gd name="connsiteX0" fmla="*/ 10050016 w 10050016"/>
+              <a:gd name="connsiteY0" fmla="*/ 175456 h 7520946"/>
+              <a:gd name="connsiteX1" fmla="*/ 906016 w 10050016"/>
+              <a:gd name="connsiteY1" fmla="*/ 175456 h 7520946"/>
+              <a:gd name="connsiteX2" fmla="*/ 906016 w 10050016"/>
+              <a:gd name="connsiteY2" fmla="*/ 7033456 h 7520946"/>
+              <a:gd name="connsiteX3" fmla="*/ 6342112 w 10050016"/>
+              <a:gd name="connsiteY3" fmla="*/ 3100399 h 7520946"/>
+              <a:gd name="connsiteX4" fmla="*/ 7206208 w 10050016"/>
+              <a:gd name="connsiteY4" fmla="*/ 3316423 h 7520946"/>
+              <a:gd name="connsiteX5" fmla="*/ 7926288 w 10050016"/>
+              <a:gd name="connsiteY5" fmla="*/ 3676463 h 7520946"/>
+              <a:gd name="connsiteX6" fmla="*/ 8574360 w 10050016"/>
+              <a:gd name="connsiteY6" fmla="*/ 3532447 h 7520946"/>
+              <a:gd name="connsiteX7" fmla="*/ 9222432 w 10050016"/>
+              <a:gd name="connsiteY7" fmla="*/ 3604455 h 7520946"/>
+              <a:gd name="connsiteX8" fmla="*/ 9798496 w 10050016"/>
+              <a:gd name="connsiteY8" fmla="*/ 2884375 h 7520946"/>
+              <a:gd name="connsiteX9" fmla="*/ 10050016 w 10050016"/>
+              <a:gd name="connsiteY9" fmla="*/ 2308311 h 7520946"/>
+              <a:gd name="connsiteX0" fmla="*/ 9809989 w 9809989"/>
+              <a:gd name="connsiteY0" fmla="*/ 175456 h 7520946"/>
+              <a:gd name="connsiteX1" fmla="*/ 665989 w 9809989"/>
+              <a:gd name="connsiteY1" fmla="*/ 175456 h 7520946"/>
+              <a:gd name="connsiteX2" fmla="*/ 665989 w 9809989"/>
+              <a:gd name="connsiteY2" fmla="*/ 7033456 h 7520946"/>
+              <a:gd name="connsiteX3" fmla="*/ 6102085 w 9809989"/>
+              <a:gd name="connsiteY3" fmla="*/ 3100399 h 7520946"/>
+              <a:gd name="connsiteX4" fmla="*/ 6966181 w 9809989"/>
+              <a:gd name="connsiteY4" fmla="*/ 3316423 h 7520946"/>
+              <a:gd name="connsiteX5" fmla="*/ 7686261 w 9809989"/>
+              <a:gd name="connsiteY5" fmla="*/ 3676463 h 7520946"/>
+              <a:gd name="connsiteX6" fmla="*/ 8334333 w 9809989"/>
+              <a:gd name="connsiteY6" fmla="*/ 3532447 h 7520946"/>
+              <a:gd name="connsiteX7" fmla="*/ 8982405 w 9809989"/>
+              <a:gd name="connsiteY7" fmla="*/ 3604455 h 7520946"/>
+              <a:gd name="connsiteX8" fmla="*/ 9558469 w 9809989"/>
+              <a:gd name="connsiteY8" fmla="*/ 2884375 h 7520946"/>
+              <a:gd name="connsiteX9" fmla="*/ 9809989 w 9809989"/>
+              <a:gd name="connsiteY9" fmla="*/ 2308311 h 7520946"/>
+              <a:gd name="connsiteX0" fmla="*/ 9144000 w 9144000"/>
+              <a:gd name="connsiteY0" fmla="*/ 175456 h 7520946"/>
+              <a:gd name="connsiteX1" fmla="*/ 0 w 9144000"/>
+              <a:gd name="connsiteY1" fmla="*/ 175456 h 7520946"/>
+              <a:gd name="connsiteX2" fmla="*/ 0 w 9144000"/>
+              <a:gd name="connsiteY2" fmla="*/ 7033456 h 7520946"/>
+              <a:gd name="connsiteX3" fmla="*/ 5436096 w 9144000"/>
+              <a:gd name="connsiteY3" fmla="*/ 3100399 h 7520946"/>
+              <a:gd name="connsiteX4" fmla="*/ 6300192 w 9144000"/>
+              <a:gd name="connsiteY4" fmla="*/ 3316423 h 7520946"/>
+              <a:gd name="connsiteX5" fmla="*/ 7020272 w 9144000"/>
+              <a:gd name="connsiteY5" fmla="*/ 3676463 h 7520946"/>
+              <a:gd name="connsiteX6" fmla="*/ 7668344 w 9144000"/>
+              <a:gd name="connsiteY6" fmla="*/ 3532447 h 7520946"/>
+              <a:gd name="connsiteX7" fmla="*/ 8316416 w 9144000"/>
+              <a:gd name="connsiteY7" fmla="*/ 3604455 h 7520946"/>
+              <a:gd name="connsiteX8" fmla="*/ 8892480 w 9144000"/>
+              <a:gd name="connsiteY8" fmla="*/ 2884375 h 7520946"/>
+              <a:gd name="connsiteX9" fmla="*/ 9144000 w 9144000"/>
+              <a:gd name="connsiteY9" fmla="*/ 2308311 h 7520946"/>
+              <a:gd name="connsiteX0" fmla="*/ 9144000 w 10194031"/>
+              <a:gd name="connsiteY0" fmla="*/ 175456 h 7652960"/>
+              <a:gd name="connsiteX1" fmla="*/ 0 w 10194031"/>
+              <a:gd name="connsiteY1" fmla="*/ 175456 h 7652960"/>
+              <a:gd name="connsiteX2" fmla="*/ 0 w 10194031"/>
+              <a:gd name="connsiteY2" fmla="*/ 7033456 h 7652960"/>
+              <a:gd name="connsiteX3" fmla="*/ 9143999 w 10194031"/>
+              <a:gd name="connsiteY3" fmla="*/ 7033455 h 7652960"/>
+              <a:gd name="connsiteX4" fmla="*/ 6300192 w 10194031"/>
+              <a:gd name="connsiteY4" fmla="*/ 3316423 h 7652960"/>
+              <a:gd name="connsiteX5" fmla="*/ 7020272 w 10194031"/>
+              <a:gd name="connsiteY5" fmla="*/ 3676463 h 7652960"/>
+              <a:gd name="connsiteX6" fmla="*/ 7668344 w 10194031"/>
+              <a:gd name="connsiteY6" fmla="*/ 3532447 h 7652960"/>
+              <a:gd name="connsiteX7" fmla="*/ 8316416 w 10194031"/>
+              <a:gd name="connsiteY7" fmla="*/ 3604455 h 7652960"/>
+              <a:gd name="connsiteX8" fmla="*/ 8892480 w 10194031"/>
+              <a:gd name="connsiteY8" fmla="*/ 2884375 h 7652960"/>
+              <a:gd name="connsiteX9" fmla="*/ 9144000 w 10194031"/>
+              <a:gd name="connsiteY9" fmla="*/ 2308311 h 7652960"/>
+              <a:gd name="connsiteX0" fmla="*/ 9144000 w 10194031"/>
+              <a:gd name="connsiteY0" fmla="*/ 175456 h 7520946"/>
+              <a:gd name="connsiteX1" fmla="*/ 0 w 10194031"/>
+              <a:gd name="connsiteY1" fmla="*/ 175456 h 7520946"/>
+              <a:gd name="connsiteX2" fmla="*/ 0 w 10194031"/>
+              <a:gd name="connsiteY2" fmla="*/ 7033456 h 7520946"/>
+              <a:gd name="connsiteX3" fmla="*/ 9143999 w 10194031"/>
+              <a:gd name="connsiteY3" fmla="*/ 6124735 h 7520946"/>
+              <a:gd name="connsiteX4" fmla="*/ 6300192 w 10194031"/>
+              <a:gd name="connsiteY4" fmla="*/ 3316423 h 7520946"/>
+              <a:gd name="connsiteX5" fmla="*/ 7020272 w 10194031"/>
+              <a:gd name="connsiteY5" fmla="*/ 3676463 h 7520946"/>
+              <a:gd name="connsiteX6" fmla="*/ 7668344 w 10194031"/>
+              <a:gd name="connsiteY6" fmla="*/ 3532447 h 7520946"/>
+              <a:gd name="connsiteX7" fmla="*/ 8316416 w 10194031"/>
+              <a:gd name="connsiteY7" fmla="*/ 3604455 h 7520946"/>
+              <a:gd name="connsiteX8" fmla="*/ 8892480 w 10194031"/>
+              <a:gd name="connsiteY8" fmla="*/ 2884375 h 7520946"/>
+              <a:gd name="connsiteX9" fmla="*/ 9144000 w 10194031"/>
+              <a:gd name="connsiteY9" fmla="*/ 2308311 h 7520946"/>
+              <a:gd name="connsiteX0" fmla="*/ 9144000 w 10194031"/>
+              <a:gd name="connsiteY0" fmla="*/ 175456 h 7520946"/>
+              <a:gd name="connsiteX1" fmla="*/ 0 w 10194031"/>
+              <a:gd name="connsiteY1" fmla="*/ 175456 h 7520946"/>
+              <a:gd name="connsiteX2" fmla="*/ 0 w 10194031"/>
+              <a:gd name="connsiteY2" fmla="*/ 7033456 h 7520946"/>
+              <a:gd name="connsiteX3" fmla="*/ 9143999 w 10194031"/>
+              <a:gd name="connsiteY3" fmla="*/ 6124735 h 7520946"/>
+              <a:gd name="connsiteX4" fmla="*/ 6300192 w 10194031"/>
+              <a:gd name="connsiteY4" fmla="*/ 3316423 h 7520946"/>
+              <a:gd name="connsiteX5" fmla="*/ 7020272 w 10194031"/>
+              <a:gd name="connsiteY5" fmla="*/ 3676463 h 7520946"/>
+              <a:gd name="connsiteX6" fmla="*/ 7668344 w 10194031"/>
+              <a:gd name="connsiteY6" fmla="*/ 3532447 h 7520946"/>
+              <a:gd name="connsiteX7" fmla="*/ 8316416 w 10194031"/>
+              <a:gd name="connsiteY7" fmla="*/ 3604455 h 7520946"/>
+              <a:gd name="connsiteX8" fmla="*/ 8892480 w 10194031"/>
+              <a:gd name="connsiteY8" fmla="*/ 2884375 h 7520946"/>
+              <a:gd name="connsiteX9" fmla="*/ 9144000 w 10194031"/>
+              <a:gd name="connsiteY9" fmla="*/ 2308311 h 7520946"/>
+              <a:gd name="connsiteX0" fmla="*/ 9144000 w 10194031"/>
+              <a:gd name="connsiteY0" fmla="*/ 175456 h 7520946"/>
+              <a:gd name="connsiteX1" fmla="*/ 0 w 10194031"/>
+              <a:gd name="connsiteY1" fmla="*/ 175456 h 7520946"/>
+              <a:gd name="connsiteX2" fmla="*/ 0 w 10194031"/>
+              <a:gd name="connsiteY2" fmla="*/ 7033456 h 7520946"/>
+              <a:gd name="connsiteX3" fmla="*/ 9143999 w 10194031"/>
+              <a:gd name="connsiteY3" fmla="*/ 7033455 h 7520946"/>
+              <a:gd name="connsiteX4" fmla="*/ 6300192 w 10194031"/>
+              <a:gd name="connsiteY4" fmla="*/ 3316423 h 7520946"/>
+              <a:gd name="connsiteX5" fmla="*/ 7020272 w 10194031"/>
+              <a:gd name="connsiteY5" fmla="*/ 3676463 h 7520946"/>
+              <a:gd name="connsiteX6" fmla="*/ 7668344 w 10194031"/>
+              <a:gd name="connsiteY6" fmla="*/ 3532447 h 7520946"/>
+              <a:gd name="connsiteX7" fmla="*/ 8316416 w 10194031"/>
+              <a:gd name="connsiteY7" fmla="*/ 3604455 h 7520946"/>
+              <a:gd name="connsiteX8" fmla="*/ 8892480 w 10194031"/>
+              <a:gd name="connsiteY8" fmla="*/ 2884375 h 7520946"/>
+              <a:gd name="connsiteX9" fmla="*/ 9144000 w 10194031"/>
+              <a:gd name="connsiteY9" fmla="*/ 2308311 h 7520946"/>
+              <a:gd name="connsiteX0" fmla="*/ 9144001 w 10194032"/>
+              <a:gd name="connsiteY0" fmla="*/ 175456 h 7033455"/>
+              <a:gd name="connsiteX1" fmla="*/ 1 w 10194032"/>
+              <a:gd name="connsiteY1" fmla="*/ 175456 h 7033455"/>
+              <a:gd name="connsiteX2" fmla="*/ 0 w 10194032"/>
+              <a:gd name="connsiteY2" fmla="*/ 6268751 h 7033455"/>
+              <a:gd name="connsiteX3" fmla="*/ 9144000 w 10194032"/>
+              <a:gd name="connsiteY3" fmla="*/ 7033455 h 7033455"/>
+              <a:gd name="connsiteX4" fmla="*/ 6300193 w 10194032"/>
+              <a:gd name="connsiteY4" fmla="*/ 3316423 h 7033455"/>
+              <a:gd name="connsiteX5" fmla="*/ 7020273 w 10194032"/>
+              <a:gd name="connsiteY5" fmla="*/ 3676463 h 7033455"/>
+              <a:gd name="connsiteX6" fmla="*/ 7668345 w 10194032"/>
+              <a:gd name="connsiteY6" fmla="*/ 3532447 h 7033455"/>
+              <a:gd name="connsiteX7" fmla="*/ 8316417 w 10194032"/>
+              <a:gd name="connsiteY7" fmla="*/ 3604455 h 7033455"/>
+              <a:gd name="connsiteX8" fmla="*/ 8892481 w 10194032"/>
+              <a:gd name="connsiteY8" fmla="*/ 2884375 h 7033455"/>
+              <a:gd name="connsiteX9" fmla="*/ 9144001 w 10194032"/>
+              <a:gd name="connsiteY9" fmla="*/ 2308311 h 7033455"/>
+              <a:gd name="connsiteX0" fmla="*/ 9144001 w 10194032"/>
+              <a:gd name="connsiteY0" fmla="*/ 175456 h 7033455"/>
+              <a:gd name="connsiteX1" fmla="*/ 1 w 10194032"/>
+              <a:gd name="connsiteY1" fmla="*/ 175456 h 7033455"/>
+              <a:gd name="connsiteX2" fmla="*/ 0 w 10194032"/>
+              <a:gd name="connsiteY2" fmla="*/ 6268751 h 7033455"/>
+              <a:gd name="connsiteX3" fmla="*/ 9144000 w 10194032"/>
+              <a:gd name="connsiteY3" fmla="*/ 7033455 h 7033455"/>
+              <a:gd name="connsiteX4" fmla="*/ 6300193 w 10194032"/>
+              <a:gd name="connsiteY4" fmla="*/ 3316423 h 7033455"/>
+              <a:gd name="connsiteX5" fmla="*/ 7020273 w 10194032"/>
+              <a:gd name="connsiteY5" fmla="*/ 3676463 h 7033455"/>
+              <a:gd name="connsiteX6" fmla="*/ 7668345 w 10194032"/>
+              <a:gd name="connsiteY6" fmla="*/ 3532447 h 7033455"/>
+              <a:gd name="connsiteX7" fmla="*/ 8316417 w 10194032"/>
+              <a:gd name="connsiteY7" fmla="*/ 3604455 h 7033455"/>
+              <a:gd name="connsiteX8" fmla="*/ 8892481 w 10194032"/>
+              <a:gd name="connsiteY8" fmla="*/ 2884375 h 7033455"/>
+              <a:gd name="connsiteX9" fmla="*/ 9144001 w 10194032"/>
+              <a:gd name="connsiteY9" fmla="*/ 2308311 h 7033455"/>
+              <a:gd name="connsiteX0" fmla="*/ 9144001 w 10194032"/>
+              <a:gd name="connsiteY0" fmla="*/ 175456 h 7033456"/>
+              <a:gd name="connsiteX1" fmla="*/ 1 w 10194032"/>
+              <a:gd name="connsiteY1" fmla="*/ 175456 h 7033456"/>
+              <a:gd name="connsiteX2" fmla="*/ 0 w 10194032"/>
+              <a:gd name="connsiteY2" fmla="*/ 7033456 h 7033456"/>
+              <a:gd name="connsiteX3" fmla="*/ 9144000 w 10194032"/>
+              <a:gd name="connsiteY3" fmla="*/ 7033455 h 7033456"/>
+              <a:gd name="connsiteX4" fmla="*/ 6300193 w 10194032"/>
+              <a:gd name="connsiteY4" fmla="*/ 3316423 h 7033456"/>
+              <a:gd name="connsiteX5" fmla="*/ 7020273 w 10194032"/>
+              <a:gd name="connsiteY5" fmla="*/ 3676463 h 7033456"/>
+              <a:gd name="connsiteX6" fmla="*/ 7668345 w 10194032"/>
+              <a:gd name="connsiteY6" fmla="*/ 3532447 h 7033456"/>
+              <a:gd name="connsiteX7" fmla="*/ 8316417 w 10194032"/>
+              <a:gd name="connsiteY7" fmla="*/ 3604455 h 7033456"/>
+              <a:gd name="connsiteX8" fmla="*/ 8892481 w 10194032"/>
+              <a:gd name="connsiteY8" fmla="*/ 2884375 h 7033456"/>
+              <a:gd name="connsiteX9" fmla="*/ 9144001 w 10194032"/>
+              <a:gd name="connsiteY9" fmla="*/ 2308311 h 7033456"/>
+              <a:gd name="connsiteX0" fmla="*/ 9144001 w 10194032"/>
+              <a:gd name="connsiteY0" fmla="*/ 175456 h 7033456"/>
+              <a:gd name="connsiteX1" fmla="*/ 1 w 10194032"/>
+              <a:gd name="connsiteY1" fmla="*/ 175456 h 7033456"/>
+              <a:gd name="connsiteX2" fmla="*/ 0 w 10194032"/>
+              <a:gd name="connsiteY2" fmla="*/ 7033456 h 7033456"/>
+              <a:gd name="connsiteX3" fmla="*/ 9144000 w 10194032"/>
+              <a:gd name="connsiteY3" fmla="*/ 7033455 h 7033456"/>
+              <a:gd name="connsiteX4" fmla="*/ 9144000 w 10194032"/>
+              <a:gd name="connsiteY4" fmla="*/ 3604455 h 7033456"/>
+              <a:gd name="connsiteX5" fmla="*/ 7020273 w 10194032"/>
+              <a:gd name="connsiteY5" fmla="*/ 3676463 h 7033456"/>
+              <a:gd name="connsiteX6" fmla="*/ 7668345 w 10194032"/>
+              <a:gd name="connsiteY6" fmla="*/ 3532447 h 7033456"/>
+              <a:gd name="connsiteX7" fmla="*/ 8316417 w 10194032"/>
+              <a:gd name="connsiteY7" fmla="*/ 3604455 h 7033456"/>
+              <a:gd name="connsiteX8" fmla="*/ 8892481 w 10194032"/>
+              <a:gd name="connsiteY8" fmla="*/ 2884375 h 7033456"/>
+              <a:gd name="connsiteX9" fmla="*/ 9144001 w 10194032"/>
+              <a:gd name="connsiteY9" fmla="*/ 2308311 h 7033456"/>
+              <a:gd name="connsiteX0" fmla="*/ 9144001 w 10194032"/>
+              <a:gd name="connsiteY0" fmla="*/ 175456 h 7033456"/>
+              <a:gd name="connsiteX1" fmla="*/ 1 w 10194032"/>
+              <a:gd name="connsiteY1" fmla="*/ 175456 h 7033456"/>
+              <a:gd name="connsiteX2" fmla="*/ 0 w 10194032"/>
+              <a:gd name="connsiteY2" fmla="*/ 7033456 h 7033456"/>
+              <a:gd name="connsiteX3" fmla="*/ 9144000 w 10194032"/>
+              <a:gd name="connsiteY3" fmla="*/ 7033455 h 7033456"/>
+              <a:gd name="connsiteX4" fmla="*/ 9144000 w 10194032"/>
+              <a:gd name="connsiteY4" fmla="*/ 3604455 h 7033456"/>
+              <a:gd name="connsiteX5" fmla="*/ 7668345 w 10194032"/>
+              <a:gd name="connsiteY5" fmla="*/ 3532447 h 7033456"/>
+              <a:gd name="connsiteX6" fmla="*/ 8316417 w 10194032"/>
+              <a:gd name="connsiteY6" fmla="*/ 3604455 h 7033456"/>
+              <a:gd name="connsiteX7" fmla="*/ 8892481 w 10194032"/>
+              <a:gd name="connsiteY7" fmla="*/ 2884375 h 7033456"/>
+              <a:gd name="connsiteX8" fmla="*/ 9144001 w 10194032"/>
+              <a:gd name="connsiteY8" fmla="*/ 2308311 h 7033456"/>
+              <a:gd name="connsiteX0" fmla="*/ 9144001 w 10194032"/>
+              <a:gd name="connsiteY0" fmla="*/ 175456 h 7033456"/>
+              <a:gd name="connsiteX1" fmla="*/ 1 w 10194032"/>
+              <a:gd name="connsiteY1" fmla="*/ 175456 h 7033456"/>
+              <a:gd name="connsiteX2" fmla="*/ 0 w 10194032"/>
+              <a:gd name="connsiteY2" fmla="*/ 7033456 h 7033456"/>
+              <a:gd name="connsiteX3" fmla="*/ 9144000 w 10194032"/>
+              <a:gd name="connsiteY3" fmla="*/ 7033455 h 7033456"/>
+              <a:gd name="connsiteX4" fmla="*/ 9144000 w 10194032"/>
+              <a:gd name="connsiteY4" fmla="*/ 3604455 h 7033456"/>
+              <a:gd name="connsiteX5" fmla="*/ 7668345 w 10194032"/>
+              <a:gd name="connsiteY5" fmla="*/ 3532447 h 7033456"/>
+              <a:gd name="connsiteX6" fmla="*/ 8892481 w 10194032"/>
+              <a:gd name="connsiteY6" fmla="*/ 2884375 h 7033456"/>
+              <a:gd name="connsiteX7" fmla="*/ 9144001 w 10194032"/>
+              <a:gd name="connsiteY7" fmla="*/ 2308311 h 7033456"/>
+              <a:gd name="connsiteX0" fmla="*/ 9144001 w 10194032"/>
+              <a:gd name="connsiteY0" fmla="*/ 175456 h 7033456"/>
+              <a:gd name="connsiteX1" fmla="*/ 1 w 10194032"/>
+              <a:gd name="connsiteY1" fmla="*/ 175456 h 7033456"/>
+              <a:gd name="connsiteX2" fmla="*/ 0 w 10194032"/>
+              <a:gd name="connsiteY2" fmla="*/ 7033456 h 7033456"/>
+              <a:gd name="connsiteX3" fmla="*/ 9144000 w 10194032"/>
+              <a:gd name="connsiteY3" fmla="*/ 7033455 h 7033456"/>
+              <a:gd name="connsiteX4" fmla="*/ 9144000 w 10194032"/>
+              <a:gd name="connsiteY4" fmla="*/ 3604455 h 7033456"/>
+              <a:gd name="connsiteX5" fmla="*/ 8460432 w 10194032"/>
+              <a:gd name="connsiteY5" fmla="*/ 3172407 h 7033456"/>
+              <a:gd name="connsiteX6" fmla="*/ 8892481 w 10194032"/>
+              <a:gd name="connsiteY6" fmla="*/ 2884375 h 7033456"/>
+              <a:gd name="connsiteX7" fmla="*/ 9144001 w 10194032"/>
+              <a:gd name="connsiteY7" fmla="*/ 2308311 h 7033456"/>
+              <a:gd name="connsiteX0" fmla="*/ 9144001 w 10194032"/>
+              <a:gd name="connsiteY0" fmla="*/ 175456 h 7033456"/>
+              <a:gd name="connsiteX1" fmla="*/ 1 w 10194032"/>
+              <a:gd name="connsiteY1" fmla="*/ 175456 h 7033456"/>
+              <a:gd name="connsiteX2" fmla="*/ 0 w 10194032"/>
+              <a:gd name="connsiteY2" fmla="*/ 7033456 h 7033456"/>
+              <a:gd name="connsiteX3" fmla="*/ 9144000 w 10194032"/>
+              <a:gd name="connsiteY3" fmla="*/ 7033455 h 7033456"/>
+              <a:gd name="connsiteX4" fmla="*/ 9144000 w 10194032"/>
+              <a:gd name="connsiteY4" fmla="*/ 3604455 h 7033456"/>
+              <a:gd name="connsiteX5" fmla="*/ 8460432 w 10194032"/>
+              <a:gd name="connsiteY5" fmla="*/ 3172407 h 7033456"/>
+              <a:gd name="connsiteX6" fmla="*/ 7956376 w 10194032"/>
+              <a:gd name="connsiteY6" fmla="*/ 2596343 h 7033456"/>
+              <a:gd name="connsiteX7" fmla="*/ 9144001 w 10194032"/>
+              <a:gd name="connsiteY7" fmla="*/ 2308311 h 7033456"/>
+              <a:gd name="connsiteX0" fmla="*/ 9144001 w 10194032"/>
+              <a:gd name="connsiteY0" fmla="*/ 175456 h 7033456"/>
+              <a:gd name="connsiteX1" fmla="*/ 1 w 10194032"/>
+              <a:gd name="connsiteY1" fmla="*/ 175456 h 7033456"/>
+              <a:gd name="connsiteX2" fmla="*/ 0 w 10194032"/>
+              <a:gd name="connsiteY2" fmla="*/ 7033456 h 7033456"/>
+              <a:gd name="connsiteX3" fmla="*/ 9144000 w 10194032"/>
+              <a:gd name="connsiteY3" fmla="*/ 7033455 h 7033456"/>
+              <a:gd name="connsiteX4" fmla="*/ 9144000 w 10194032"/>
+              <a:gd name="connsiteY4" fmla="*/ 3604455 h 7033456"/>
+              <a:gd name="connsiteX5" fmla="*/ 8460432 w 10194032"/>
+              <a:gd name="connsiteY5" fmla="*/ 3172407 h 7033456"/>
+              <a:gd name="connsiteX6" fmla="*/ 7956376 w 10194032"/>
+              <a:gd name="connsiteY6" fmla="*/ 2596343 h 7033456"/>
+              <a:gd name="connsiteX7" fmla="*/ 6588224 w 10194032"/>
+              <a:gd name="connsiteY7" fmla="*/ 1948271 h 7033456"/>
+              <a:gd name="connsiteX0" fmla="*/ 9144001 w 10194032"/>
+              <a:gd name="connsiteY0" fmla="*/ 1144509 h 8002509"/>
+              <a:gd name="connsiteX1" fmla="*/ 6156176 w 10194032"/>
+              <a:gd name="connsiteY1" fmla="*/ 1144508 h 8002509"/>
+              <a:gd name="connsiteX2" fmla="*/ 1 w 10194032"/>
+              <a:gd name="connsiteY2" fmla="*/ 1144509 h 8002509"/>
+              <a:gd name="connsiteX3" fmla="*/ 0 w 10194032"/>
+              <a:gd name="connsiteY3" fmla="*/ 8002509 h 8002509"/>
+              <a:gd name="connsiteX4" fmla="*/ 9144000 w 10194032"/>
+              <a:gd name="connsiteY4" fmla="*/ 8002508 h 8002509"/>
+              <a:gd name="connsiteX5" fmla="*/ 9144000 w 10194032"/>
+              <a:gd name="connsiteY5" fmla="*/ 4573508 h 8002509"/>
+              <a:gd name="connsiteX6" fmla="*/ 8460432 w 10194032"/>
+              <a:gd name="connsiteY6" fmla="*/ 4141460 h 8002509"/>
+              <a:gd name="connsiteX7" fmla="*/ 7956376 w 10194032"/>
+              <a:gd name="connsiteY7" fmla="*/ 3565396 h 8002509"/>
+              <a:gd name="connsiteX8" fmla="*/ 6588224 w 10194032"/>
+              <a:gd name="connsiteY8" fmla="*/ 2917324 h 8002509"/>
+              <a:gd name="connsiteX0" fmla="*/ 9144001 w 10194032"/>
+              <a:gd name="connsiteY0" fmla="*/ 163781 h 7021781"/>
+              <a:gd name="connsiteX1" fmla="*/ 6156176 w 10194032"/>
+              <a:gd name="connsiteY1" fmla="*/ 163780 h 7021781"/>
+              <a:gd name="connsiteX2" fmla="*/ 0 w 10194032"/>
+              <a:gd name="connsiteY2" fmla="*/ 1144509 h 7021781"/>
+              <a:gd name="connsiteX3" fmla="*/ 0 w 10194032"/>
+              <a:gd name="connsiteY3" fmla="*/ 7021781 h 7021781"/>
+              <a:gd name="connsiteX4" fmla="*/ 9144000 w 10194032"/>
+              <a:gd name="connsiteY4" fmla="*/ 7021780 h 7021781"/>
+              <a:gd name="connsiteX5" fmla="*/ 9144000 w 10194032"/>
+              <a:gd name="connsiteY5" fmla="*/ 3592780 h 7021781"/>
+              <a:gd name="connsiteX6" fmla="*/ 8460432 w 10194032"/>
+              <a:gd name="connsiteY6" fmla="*/ 3160732 h 7021781"/>
+              <a:gd name="connsiteX7" fmla="*/ 7956376 w 10194032"/>
+              <a:gd name="connsiteY7" fmla="*/ 2584668 h 7021781"/>
+              <a:gd name="connsiteX8" fmla="*/ 6588224 w 10194032"/>
+              <a:gd name="connsiteY8" fmla="*/ 1936596 h 7021781"/>
+              <a:gd name="connsiteX0" fmla="*/ 9144001 w 10194032"/>
+              <a:gd name="connsiteY0" fmla="*/ 163456 h 7021456"/>
+              <a:gd name="connsiteX1" fmla="*/ 6156176 w 10194032"/>
+              <a:gd name="connsiteY1" fmla="*/ 163455 h 7021456"/>
+              <a:gd name="connsiteX2" fmla="*/ 0 w 10194032"/>
+              <a:gd name="connsiteY2" fmla="*/ 1144184 h 7021456"/>
+              <a:gd name="connsiteX3" fmla="*/ 0 w 10194032"/>
+              <a:gd name="connsiteY3" fmla="*/ 7021456 h 7021456"/>
+              <a:gd name="connsiteX4" fmla="*/ 9144000 w 10194032"/>
+              <a:gd name="connsiteY4" fmla="*/ 7021455 h 7021456"/>
+              <a:gd name="connsiteX5" fmla="*/ 9144000 w 10194032"/>
+              <a:gd name="connsiteY5" fmla="*/ 3592455 h 7021456"/>
+              <a:gd name="connsiteX6" fmla="*/ 8460432 w 10194032"/>
+              <a:gd name="connsiteY6" fmla="*/ 3160407 h 7021456"/>
+              <a:gd name="connsiteX7" fmla="*/ 7956376 w 10194032"/>
+              <a:gd name="connsiteY7" fmla="*/ 2584343 h 7021456"/>
+              <a:gd name="connsiteX8" fmla="*/ 6588224 w 10194032"/>
+              <a:gd name="connsiteY8" fmla="*/ 1936271 h 7021456"/>
+              <a:gd name="connsiteX0" fmla="*/ 9144001 w 10194032"/>
+              <a:gd name="connsiteY0" fmla="*/ 1509 h 6859509"/>
+              <a:gd name="connsiteX1" fmla="*/ 6156176 w 10194032"/>
+              <a:gd name="connsiteY1" fmla="*/ 1508 h 6859509"/>
+              <a:gd name="connsiteX2" fmla="*/ 0 w 10194032"/>
+              <a:gd name="connsiteY2" fmla="*/ 1508 h 6859509"/>
+              <a:gd name="connsiteX3" fmla="*/ 0 w 10194032"/>
+              <a:gd name="connsiteY3" fmla="*/ 6859509 h 6859509"/>
+              <a:gd name="connsiteX4" fmla="*/ 9144000 w 10194032"/>
+              <a:gd name="connsiteY4" fmla="*/ 6859508 h 6859509"/>
+              <a:gd name="connsiteX5" fmla="*/ 9144000 w 10194032"/>
+              <a:gd name="connsiteY5" fmla="*/ 3430508 h 6859509"/>
+              <a:gd name="connsiteX6" fmla="*/ 8460432 w 10194032"/>
+              <a:gd name="connsiteY6" fmla="*/ 2998460 h 6859509"/>
+              <a:gd name="connsiteX7" fmla="*/ 7956376 w 10194032"/>
+              <a:gd name="connsiteY7" fmla="*/ 2422396 h 6859509"/>
+              <a:gd name="connsiteX8" fmla="*/ 6588224 w 10194032"/>
+              <a:gd name="connsiteY8" fmla="*/ 1774324 h 6859509"/>
+              <a:gd name="connsiteX0" fmla="*/ 7092280 w 10194032"/>
+              <a:gd name="connsiteY0" fmla="*/ 548680 h 6858001"/>
+              <a:gd name="connsiteX1" fmla="*/ 6156176 w 10194032"/>
+              <a:gd name="connsiteY1" fmla="*/ 0 h 6858001"/>
+              <a:gd name="connsiteX2" fmla="*/ 0 w 10194032"/>
+              <a:gd name="connsiteY2" fmla="*/ 0 h 6858001"/>
+              <a:gd name="connsiteX3" fmla="*/ 0 w 10194032"/>
+              <a:gd name="connsiteY3" fmla="*/ 6858001 h 6858001"/>
+              <a:gd name="connsiteX4" fmla="*/ 9144000 w 10194032"/>
+              <a:gd name="connsiteY4" fmla="*/ 6858000 h 6858001"/>
+              <a:gd name="connsiteX5" fmla="*/ 9144000 w 10194032"/>
+              <a:gd name="connsiteY5" fmla="*/ 3429000 h 6858001"/>
+              <a:gd name="connsiteX6" fmla="*/ 8460432 w 10194032"/>
+              <a:gd name="connsiteY6" fmla="*/ 2996952 h 6858001"/>
+              <a:gd name="connsiteX7" fmla="*/ 7956376 w 10194032"/>
+              <a:gd name="connsiteY7" fmla="*/ 2420888 h 6858001"/>
+              <a:gd name="connsiteX8" fmla="*/ 6588224 w 10194032"/>
+              <a:gd name="connsiteY8" fmla="*/ 1772816 h 6858001"/>
+              <a:gd name="connsiteX0" fmla="*/ 6012160 w 10194032"/>
+              <a:gd name="connsiteY0" fmla="*/ 1340768 h 6858001"/>
+              <a:gd name="connsiteX1" fmla="*/ 6156176 w 10194032"/>
+              <a:gd name="connsiteY1" fmla="*/ 0 h 6858001"/>
+              <a:gd name="connsiteX2" fmla="*/ 0 w 10194032"/>
+              <a:gd name="connsiteY2" fmla="*/ 0 h 6858001"/>
+              <a:gd name="connsiteX3" fmla="*/ 0 w 10194032"/>
+              <a:gd name="connsiteY3" fmla="*/ 6858001 h 6858001"/>
+              <a:gd name="connsiteX4" fmla="*/ 9144000 w 10194032"/>
+              <a:gd name="connsiteY4" fmla="*/ 6858000 h 6858001"/>
+              <a:gd name="connsiteX5" fmla="*/ 9144000 w 10194032"/>
+              <a:gd name="connsiteY5" fmla="*/ 3429000 h 6858001"/>
+              <a:gd name="connsiteX6" fmla="*/ 8460432 w 10194032"/>
+              <a:gd name="connsiteY6" fmla="*/ 2996952 h 6858001"/>
+              <a:gd name="connsiteX7" fmla="*/ 7956376 w 10194032"/>
+              <a:gd name="connsiteY7" fmla="*/ 2420888 h 6858001"/>
+              <a:gd name="connsiteX8" fmla="*/ 6588224 w 10194032"/>
+              <a:gd name="connsiteY8" fmla="*/ 1772816 h 6858001"/>
+              <a:gd name="connsiteX0" fmla="*/ 6012160 w 10194032"/>
+              <a:gd name="connsiteY0" fmla="*/ 1340768 h 6858001"/>
+              <a:gd name="connsiteX1" fmla="*/ 6156176 w 10194032"/>
+              <a:gd name="connsiteY1" fmla="*/ 0 h 6858001"/>
+              <a:gd name="connsiteX2" fmla="*/ 0 w 10194032"/>
+              <a:gd name="connsiteY2" fmla="*/ 0 h 6858001"/>
+              <a:gd name="connsiteX3" fmla="*/ 0 w 10194032"/>
+              <a:gd name="connsiteY3" fmla="*/ 6858001 h 6858001"/>
+              <a:gd name="connsiteX4" fmla="*/ 9144000 w 10194032"/>
+              <a:gd name="connsiteY4" fmla="*/ 6858000 h 6858001"/>
+              <a:gd name="connsiteX5" fmla="*/ 9144000 w 10194032"/>
+              <a:gd name="connsiteY5" fmla="*/ 3429000 h 6858001"/>
+              <a:gd name="connsiteX6" fmla="*/ 8460432 w 10194032"/>
+              <a:gd name="connsiteY6" fmla="*/ 2996952 h 6858001"/>
+              <a:gd name="connsiteX7" fmla="*/ 7956376 w 10194032"/>
+              <a:gd name="connsiteY7" fmla="*/ 2420888 h 6858001"/>
+              <a:gd name="connsiteX8" fmla="*/ 6012160 w 10194032"/>
+              <a:gd name="connsiteY8" fmla="*/ 1340768 h 6858001"/>
+              <a:gd name="connsiteX0" fmla="*/ 6012160 w 10194032"/>
+              <a:gd name="connsiteY0" fmla="*/ 1340768 h 6858001"/>
+              <a:gd name="connsiteX1" fmla="*/ 6156176 w 10194032"/>
+              <a:gd name="connsiteY1" fmla="*/ 0 h 6858001"/>
+              <a:gd name="connsiteX2" fmla="*/ 0 w 10194032"/>
+              <a:gd name="connsiteY2" fmla="*/ 0 h 6858001"/>
+              <a:gd name="connsiteX3" fmla="*/ 0 w 10194032"/>
+              <a:gd name="connsiteY3" fmla="*/ 6858001 h 6858001"/>
+              <a:gd name="connsiteX4" fmla="*/ 9144000 w 10194032"/>
+              <a:gd name="connsiteY4" fmla="*/ 6858000 h 6858001"/>
+              <a:gd name="connsiteX5" fmla="*/ 9144000 w 10194032"/>
+              <a:gd name="connsiteY5" fmla="*/ 3429000 h 6858001"/>
+              <a:gd name="connsiteX6" fmla="*/ 8460432 w 10194032"/>
+              <a:gd name="connsiteY6" fmla="*/ 2996952 h 6858001"/>
+              <a:gd name="connsiteX7" fmla="*/ 5868144 w 10194032"/>
+              <a:gd name="connsiteY7" fmla="*/ 1628800 h 6858001"/>
+              <a:gd name="connsiteX8" fmla="*/ 6012160 w 10194032"/>
+              <a:gd name="connsiteY8" fmla="*/ 1340768 h 6858001"/>
+              <a:gd name="connsiteX0" fmla="*/ 6012160 w 10194032"/>
+              <a:gd name="connsiteY0" fmla="*/ 1340768 h 6858001"/>
+              <a:gd name="connsiteX1" fmla="*/ 6156176 w 10194032"/>
+              <a:gd name="connsiteY1" fmla="*/ 0 h 6858001"/>
+              <a:gd name="connsiteX2" fmla="*/ 0 w 10194032"/>
+              <a:gd name="connsiteY2" fmla="*/ 0 h 6858001"/>
+              <a:gd name="connsiteX3" fmla="*/ 0 w 10194032"/>
+              <a:gd name="connsiteY3" fmla="*/ 6858001 h 6858001"/>
+              <a:gd name="connsiteX4" fmla="*/ 9144000 w 10194032"/>
+              <a:gd name="connsiteY4" fmla="*/ 6858000 h 6858001"/>
+              <a:gd name="connsiteX5" fmla="*/ 9144000 w 10194032"/>
+              <a:gd name="connsiteY5" fmla="*/ 3429000 h 6858001"/>
+              <a:gd name="connsiteX6" fmla="*/ 8460432 w 10194032"/>
+              <a:gd name="connsiteY6" fmla="*/ 2996952 h 6858001"/>
+              <a:gd name="connsiteX7" fmla="*/ 5724128 w 10194032"/>
+              <a:gd name="connsiteY7" fmla="*/ 1772816 h 6858001"/>
+              <a:gd name="connsiteX8" fmla="*/ 6012160 w 10194032"/>
+              <a:gd name="connsiteY8" fmla="*/ 1340768 h 6858001"/>
+              <a:gd name="connsiteX0" fmla="*/ 6012160 w 10194032"/>
+              <a:gd name="connsiteY0" fmla="*/ 1340768 h 6858001"/>
+              <a:gd name="connsiteX1" fmla="*/ 6156176 w 10194032"/>
+              <a:gd name="connsiteY1" fmla="*/ 0 h 6858001"/>
+              <a:gd name="connsiteX2" fmla="*/ 0 w 10194032"/>
+              <a:gd name="connsiteY2" fmla="*/ 0 h 6858001"/>
+              <a:gd name="connsiteX3" fmla="*/ 0 w 10194032"/>
+              <a:gd name="connsiteY3" fmla="*/ 6858001 h 6858001"/>
+              <a:gd name="connsiteX4" fmla="*/ 9144000 w 10194032"/>
+              <a:gd name="connsiteY4" fmla="*/ 6858000 h 6858001"/>
+              <a:gd name="connsiteX5" fmla="*/ 9144000 w 10194032"/>
+              <a:gd name="connsiteY5" fmla="*/ 3429000 h 6858001"/>
+              <a:gd name="connsiteX6" fmla="*/ 7380312 w 10194032"/>
+              <a:gd name="connsiteY6" fmla="*/ 2204865 h 6858001"/>
+              <a:gd name="connsiteX7" fmla="*/ 5724128 w 10194032"/>
+              <a:gd name="connsiteY7" fmla="*/ 1772816 h 6858001"/>
+              <a:gd name="connsiteX8" fmla="*/ 6012160 w 10194032"/>
+              <a:gd name="connsiteY8" fmla="*/ 1340768 h 6858001"/>
+              <a:gd name="connsiteX0" fmla="*/ 6012160 w 10194032"/>
+              <a:gd name="connsiteY0" fmla="*/ 1340768 h 6858001"/>
+              <a:gd name="connsiteX1" fmla="*/ 6156176 w 10194032"/>
+              <a:gd name="connsiteY1" fmla="*/ 0 h 6858001"/>
+              <a:gd name="connsiteX2" fmla="*/ 0 w 10194032"/>
+              <a:gd name="connsiteY2" fmla="*/ 0 h 6858001"/>
+              <a:gd name="connsiteX3" fmla="*/ 0 w 10194032"/>
+              <a:gd name="connsiteY3" fmla="*/ 6858001 h 6858001"/>
+              <a:gd name="connsiteX4" fmla="*/ 9144000 w 10194032"/>
+              <a:gd name="connsiteY4" fmla="*/ 6858000 h 6858001"/>
+              <a:gd name="connsiteX5" fmla="*/ 9144000 w 10194032"/>
+              <a:gd name="connsiteY5" fmla="*/ 3429000 h 6858001"/>
+              <a:gd name="connsiteX6" fmla="*/ 7380312 w 10194032"/>
+              <a:gd name="connsiteY6" fmla="*/ 2204865 h 6858001"/>
+              <a:gd name="connsiteX7" fmla="*/ 5724128 w 10194032"/>
+              <a:gd name="connsiteY7" fmla="*/ 1772816 h 6858001"/>
+              <a:gd name="connsiteX8" fmla="*/ 6012160 w 10194032"/>
+              <a:gd name="connsiteY8" fmla="*/ 1340768 h 6858001"/>
+              <a:gd name="connsiteX0" fmla="*/ 6012160 w 9144000"/>
+              <a:gd name="connsiteY0" fmla="*/ 1340768 h 6858001"/>
+              <a:gd name="connsiteX1" fmla="*/ 6156176 w 9144000"/>
+              <a:gd name="connsiteY1" fmla="*/ 0 h 6858001"/>
+              <a:gd name="connsiteX2" fmla="*/ 0 w 9144000"/>
+              <a:gd name="connsiteY2" fmla="*/ 0 h 6858001"/>
+              <a:gd name="connsiteX3" fmla="*/ 0 w 9144000"/>
+              <a:gd name="connsiteY3" fmla="*/ 6858001 h 6858001"/>
+              <a:gd name="connsiteX4" fmla="*/ 9144000 w 9144000"/>
+              <a:gd name="connsiteY4" fmla="*/ 6858000 h 6858001"/>
+              <a:gd name="connsiteX5" fmla="*/ 9144000 w 9144000"/>
+              <a:gd name="connsiteY5" fmla="*/ 3429000 h 6858001"/>
+              <a:gd name="connsiteX6" fmla="*/ 7380312 w 9144000"/>
+              <a:gd name="connsiteY6" fmla="*/ 2204865 h 6858001"/>
+              <a:gd name="connsiteX7" fmla="*/ 5724128 w 9144000"/>
+              <a:gd name="connsiteY7" fmla="*/ 1772816 h 6858001"/>
+              <a:gd name="connsiteX8" fmla="*/ 6012160 w 9144000"/>
+              <a:gd name="connsiteY8" fmla="*/ 1340768 h 6858001"/>
+              <a:gd name="connsiteX0" fmla="*/ 6012160 w 9144000"/>
+              <a:gd name="connsiteY0" fmla="*/ 1340768 h 6858001"/>
+              <a:gd name="connsiteX1" fmla="*/ 6156176 w 9144000"/>
+              <a:gd name="connsiteY1" fmla="*/ 0 h 6858001"/>
+              <a:gd name="connsiteX2" fmla="*/ 0 w 9144000"/>
+              <a:gd name="connsiteY2" fmla="*/ 0 h 6858001"/>
+              <a:gd name="connsiteX3" fmla="*/ 0 w 9144000"/>
+              <a:gd name="connsiteY3" fmla="*/ 6858001 h 6858001"/>
+              <a:gd name="connsiteX4" fmla="*/ 9144000 w 9144000"/>
+              <a:gd name="connsiteY4" fmla="*/ 6858000 h 6858001"/>
+              <a:gd name="connsiteX5" fmla="*/ 9144000 w 9144000"/>
+              <a:gd name="connsiteY5" fmla="*/ 3429000 h 6858001"/>
+              <a:gd name="connsiteX6" fmla="*/ 7380312 w 9144000"/>
+              <a:gd name="connsiteY6" fmla="*/ 2996953 h 6858001"/>
+              <a:gd name="connsiteX7" fmla="*/ 5724128 w 9144000"/>
+              <a:gd name="connsiteY7" fmla="*/ 1772816 h 6858001"/>
+              <a:gd name="connsiteX8" fmla="*/ 6012160 w 9144000"/>
+              <a:gd name="connsiteY8" fmla="*/ 1340768 h 6858001"/>
+              <a:gd name="connsiteX0" fmla="*/ 6012160 w 9144000"/>
+              <a:gd name="connsiteY0" fmla="*/ 1340768 h 6858001"/>
+              <a:gd name="connsiteX1" fmla="*/ 6156176 w 9144000"/>
+              <a:gd name="connsiteY1" fmla="*/ 0 h 6858001"/>
+              <a:gd name="connsiteX2" fmla="*/ 0 w 9144000"/>
+              <a:gd name="connsiteY2" fmla="*/ 0 h 6858001"/>
+              <a:gd name="connsiteX3" fmla="*/ 0 w 9144000"/>
+              <a:gd name="connsiteY3" fmla="*/ 6858001 h 6858001"/>
+              <a:gd name="connsiteX4" fmla="*/ 9144000 w 9144000"/>
+              <a:gd name="connsiteY4" fmla="*/ 6858000 h 6858001"/>
+              <a:gd name="connsiteX5" fmla="*/ 9144000 w 9144000"/>
+              <a:gd name="connsiteY5" fmla="*/ 3429000 h 6858001"/>
+              <a:gd name="connsiteX6" fmla="*/ 7380312 w 9144000"/>
+              <a:gd name="connsiteY6" fmla="*/ 2996953 h 6858001"/>
+              <a:gd name="connsiteX7" fmla="*/ 6012160 w 9144000"/>
+              <a:gd name="connsiteY7" fmla="*/ 2132857 h 6858001"/>
+              <a:gd name="connsiteX8" fmla="*/ 6012160 w 9144000"/>
+              <a:gd name="connsiteY8" fmla="*/ 1340768 h 6858001"/>
+              <a:gd name="connsiteX0" fmla="*/ 6012160 w 9144000"/>
+              <a:gd name="connsiteY0" fmla="*/ 1340768 h 6858001"/>
+              <a:gd name="connsiteX1" fmla="*/ 6156176 w 9144000"/>
+              <a:gd name="connsiteY1" fmla="*/ 0 h 6858001"/>
+              <a:gd name="connsiteX2" fmla="*/ 0 w 9144000"/>
+              <a:gd name="connsiteY2" fmla="*/ 0 h 6858001"/>
+              <a:gd name="connsiteX3" fmla="*/ 0 w 9144000"/>
+              <a:gd name="connsiteY3" fmla="*/ 6858001 h 6858001"/>
+              <a:gd name="connsiteX4" fmla="*/ 9144000 w 9144000"/>
+              <a:gd name="connsiteY4" fmla="*/ 6858000 h 6858001"/>
+              <a:gd name="connsiteX5" fmla="*/ 9144000 w 9144000"/>
+              <a:gd name="connsiteY5" fmla="*/ 3429000 h 6858001"/>
+              <a:gd name="connsiteX6" fmla="*/ 7380312 w 9144000"/>
+              <a:gd name="connsiteY6" fmla="*/ 2996953 h 6858001"/>
+              <a:gd name="connsiteX7" fmla="*/ 6012160 w 9144000"/>
+              <a:gd name="connsiteY7" fmla="*/ 2132857 h 6858001"/>
+              <a:gd name="connsiteX8" fmla="*/ 6444208 w 9144000"/>
+              <a:gd name="connsiteY8" fmla="*/ 1052737 h 6858001"/>
+              <a:gd name="connsiteX0" fmla="*/ 6012160 w 9144000"/>
+              <a:gd name="connsiteY0" fmla="*/ 1340768 h 6858001"/>
+              <a:gd name="connsiteX1" fmla="*/ 6156176 w 9144000"/>
+              <a:gd name="connsiteY1" fmla="*/ 0 h 6858001"/>
+              <a:gd name="connsiteX2" fmla="*/ 0 w 9144000"/>
+              <a:gd name="connsiteY2" fmla="*/ 0 h 6858001"/>
+              <a:gd name="connsiteX3" fmla="*/ 0 w 9144000"/>
+              <a:gd name="connsiteY3" fmla="*/ 6858001 h 6858001"/>
+              <a:gd name="connsiteX4" fmla="*/ 9144000 w 9144000"/>
+              <a:gd name="connsiteY4" fmla="*/ 6858000 h 6858001"/>
+              <a:gd name="connsiteX5" fmla="*/ 9144000 w 9144000"/>
+              <a:gd name="connsiteY5" fmla="*/ 3429000 h 6858001"/>
+              <a:gd name="connsiteX6" fmla="*/ 7380312 w 9144000"/>
+              <a:gd name="connsiteY6" fmla="*/ 2996953 h 6858001"/>
+              <a:gd name="connsiteX7" fmla="*/ 6012160 w 9144000"/>
+              <a:gd name="connsiteY7" fmla="*/ 2132857 h 6858001"/>
+              <a:gd name="connsiteX0" fmla="*/ 6012160 w 9144000"/>
+              <a:gd name="connsiteY0" fmla="*/ 1340768 h 6858001"/>
+              <a:gd name="connsiteX1" fmla="*/ 6156176 w 9144000"/>
+              <a:gd name="connsiteY1" fmla="*/ 0 h 6858001"/>
+              <a:gd name="connsiteX2" fmla="*/ 0 w 9144000"/>
+              <a:gd name="connsiteY2" fmla="*/ 0 h 6858001"/>
+              <a:gd name="connsiteX3" fmla="*/ 0 w 9144000"/>
+              <a:gd name="connsiteY3" fmla="*/ 6858001 h 6858001"/>
+              <a:gd name="connsiteX4" fmla="*/ 9144000 w 9144000"/>
+              <a:gd name="connsiteY4" fmla="*/ 6858000 h 6858001"/>
+              <a:gd name="connsiteX5" fmla="*/ 9144000 w 9144000"/>
+              <a:gd name="connsiteY5" fmla="*/ 3429000 h 6858001"/>
+              <a:gd name="connsiteX6" fmla="*/ 7380312 w 9144000"/>
+              <a:gd name="connsiteY6" fmla="*/ 2996953 h 6858001"/>
+              <a:gd name="connsiteX7" fmla="*/ 6012160 w 9144000"/>
+              <a:gd name="connsiteY7" fmla="*/ 1340769 h 6858001"/>
+              <a:gd name="connsiteX0" fmla="*/ 6012160 w 9144000"/>
+              <a:gd name="connsiteY0" fmla="*/ 1340768 h 6858001"/>
+              <a:gd name="connsiteX1" fmla="*/ 6156176 w 9144000"/>
+              <a:gd name="connsiteY1" fmla="*/ 0 h 6858001"/>
+              <a:gd name="connsiteX2" fmla="*/ 0 w 9144000"/>
+              <a:gd name="connsiteY2" fmla="*/ 0 h 6858001"/>
+              <a:gd name="connsiteX3" fmla="*/ 0 w 9144000"/>
+              <a:gd name="connsiteY3" fmla="*/ 6858001 h 6858001"/>
+              <a:gd name="connsiteX4" fmla="*/ 9144000 w 9144000"/>
+              <a:gd name="connsiteY4" fmla="*/ 6858000 h 6858001"/>
+              <a:gd name="connsiteX5" fmla="*/ 9144000 w 9144000"/>
+              <a:gd name="connsiteY5" fmla="*/ 3429000 h 6858001"/>
+              <a:gd name="connsiteX6" fmla="*/ 7380312 w 9144000"/>
+              <a:gd name="connsiteY6" fmla="*/ 2996953 h 6858001"/>
+              <a:gd name="connsiteX7" fmla="*/ 5436096 w 9144000"/>
+              <a:gd name="connsiteY7" fmla="*/ 1628801 h 6858001"/>
+              <a:gd name="connsiteX0" fmla="*/ 5436096 w 9144000"/>
+              <a:gd name="connsiteY0" fmla="*/ 1628801 h 6858001"/>
+              <a:gd name="connsiteX1" fmla="*/ 6156176 w 9144000"/>
+              <a:gd name="connsiteY1" fmla="*/ 0 h 6858001"/>
+              <a:gd name="connsiteX2" fmla="*/ 0 w 9144000"/>
+              <a:gd name="connsiteY2" fmla="*/ 0 h 6858001"/>
+              <a:gd name="connsiteX3" fmla="*/ 0 w 9144000"/>
+              <a:gd name="connsiteY3" fmla="*/ 6858001 h 6858001"/>
+              <a:gd name="connsiteX4" fmla="*/ 9144000 w 9144000"/>
+              <a:gd name="connsiteY4" fmla="*/ 6858000 h 6858001"/>
+              <a:gd name="connsiteX5" fmla="*/ 9144000 w 9144000"/>
+              <a:gd name="connsiteY5" fmla="*/ 3429000 h 6858001"/>
+              <a:gd name="connsiteX6" fmla="*/ 7380312 w 9144000"/>
+              <a:gd name="connsiteY6" fmla="*/ 2996953 h 6858001"/>
+              <a:gd name="connsiteX7" fmla="*/ 5436096 w 9144000"/>
+              <a:gd name="connsiteY7" fmla="*/ 1628801 h 6858001"/>
+              <a:gd name="connsiteX0" fmla="*/ 5436096 w 9144000"/>
+              <a:gd name="connsiteY0" fmla="*/ 1628801 h 6858001"/>
+              <a:gd name="connsiteX1" fmla="*/ 5508104 w 9144000"/>
+              <a:gd name="connsiteY1" fmla="*/ 1 h 6858001"/>
+              <a:gd name="connsiteX2" fmla="*/ 0 w 9144000"/>
+              <a:gd name="connsiteY2" fmla="*/ 0 h 6858001"/>
+              <a:gd name="connsiteX3" fmla="*/ 0 w 9144000"/>
+              <a:gd name="connsiteY3" fmla="*/ 6858001 h 6858001"/>
+              <a:gd name="connsiteX4" fmla="*/ 9144000 w 9144000"/>
+              <a:gd name="connsiteY4" fmla="*/ 6858000 h 6858001"/>
+              <a:gd name="connsiteX5" fmla="*/ 9144000 w 9144000"/>
+              <a:gd name="connsiteY5" fmla="*/ 3429000 h 6858001"/>
+              <a:gd name="connsiteX6" fmla="*/ 7380312 w 9144000"/>
+              <a:gd name="connsiteY6" fmla="*/ 2996953 h 6858001"/>
+              <a:gd name="connsiteX7" fmla="*/ 5436096 w 9144000"/>
+              <a:gd name="connsiteY7" fmla="*/ 1628801 h 6858001"/>
+              <a:gd name="connsiteX0" fmla="*/ 5436096 w 9144000"/>
+              <a:gd name="connsiteY0" fmla="*/ 1628801 h 6858001"/>
+              <a:gd name="connsiteX1" fmla="*/ 5508104 w 9144000"/>
+              <a:gd name="connsiteY1" fmla="*/ 1 h 6858001"/>
+              <a:gd name="connsiteX2" fmla="*/ 0 w 9144000"/>
+              <a:gd name="connsiteY2" fmla="*/ 0 h 6858001"/>
+              <a:gd name="connsiteX3" fmla="*/ 0 w 9144000"/>
+              <a:gd name="connsiteY3" fmla="*/ 6858001 h 6858001"/>
+              <a:gd name="connsiteX4" fmla="*/ 9144000 w 9144000"/>
+              <a:gd name="connsiteY4" fmla="*/ 6858000 h 6858001"/>
+              <a:gd name="connsiteX5" fmla="*/ 9144000 w 9144000"/>
+              <a:gd name="connsiteY5" fmla="*/ 3429000 h 6858001"/>
+              <a:gd name="connsiteX6" fmla="*/ 6588224 w 9144000"/>
+              <a:gd name="connsiteY6" fmla="*/ 2708921 h 6858001"/>
+              <a:gd name="connsiteX7" fmla="*/ 5436096 w 9144000"/>
+              <a:gd name="connsiteY7" fmla="*/ 1628801 h 6858001"/>
+              <a:gd name="connsiteX0" fmla="*/ 5436096 w 9144000"/>
+              <a:gd name="connsiteY0" fmla="*/ 1628801 h 6858001"/>
+              <a:gd name="connsiteX1" fmla="*/ 5508104 w 9144000"/>
+              <a:gd name="connsiteY1" fmla="*/ 1 h 6858001"/>
+              <a:gd name="connsiteX2" fmla="*/ 0 w 9144000"/>
+              <a:gd name="connsiteY2" fmla="*/ 0 h 6858001"/>
+              <a:gd name="connsiteX3" fmla="*/ 0 w 9144000"/>
+              <a:gd name="connsiteY3" fmla="*/ 6858001 h 6858001"/>
+              <a:gd name="connsiteX4" fmla="*/ 9144000 w 9144000"/>
+              <a:gd name="connsiteY4" fmla="*/ 6858000 h 6858001"/>
+              <a:gd name="connsiteX5" fmla="*/ 9144000 w 9144000"/>
+              <a:gd name="connsiteY5" fmla="*/ 3429000 h 6858001"/>
+              <a:gd name="connsiteX6" fmla="*/ 7840301 w 9144000"/>
+              <a:gd name="connsiteY6" fmla="*/ 2888056 h 6858001"/>
+              <a:gd name="connsiteX7" fmla="*/ 6588224 w 9144000"/>
+              <a:gd name="connsiteY7" fmla="*/ 2708921 h 6858001"/>
+              <a:gd name="connsiteX8" fmla="*/ 5436096 w 9144000"/>
+              <a:gd name="connsiteY8" fmla="*/ 1628801 h 6858001"/>
+              <a:gd name="connsiteX0" fmla="*/ 5436096 w 9144000"/>
+              <a:gd name="connsiteY0" fmla="*/ 1628801 h 6858001"/>
+              <a:gd name="connsiteX1" fmla="*/ 5508104 w 9144000"/>
+              <a:gd name="connsiteY1" fmla="*/ 1 h 6858001"/>
+              <a:gd name="connsiteX2" fmla="*/ 0 w 9144000"/>
+              <a:gd name="connsiteY2" fmla="*/ 0 h 6858001"/>
+              <a:gd name="connsiteX3" fmla="*/ 0 w 9144000"/>
+              <a:gd name="connsiteY3" fmla="*/ 6858001 h 6858001"/>
+              <a:gd name="connsiteX4" fmla="*/ 9144000 w 9144000"/>
+              <a:gd name="connsiteY4" fmla="*/ 6858000 h 6858001"/>
+              <a:gd name="connsiteX5" fmla="*/ 9144000 w 9144000"/>
+              <a:gd name="connsiteY5" fmla="*/ 3429000 h 6858001"/>
+              <a:gd name="connsiteX6" fmla="*/ 7956376 w 9144000"/>
+              <a:gd name="connsiteY6" fmla="*/ 2636913 h 6858001"/>
+              <a:gd name="connsiteX7" fmla="*/ 6588224 w 9144000"/>
+              <a:gd name="connsiteY7" fmla="*/ 2708921 h 6858001"/>
+              <a:gd name="connsiteX8" fmla="*/ 5436096 w 9144000"/>
+              <a:gd name="connsiteY8" fmla="*/ 1628801 h 6858001"/>
+              <a:gd name="connsiteX0" fmla="*/ 5436096 w 9144000"/>
+              <a:gd name="connsiteY0" fmla="*/ 1628801 h 6858001"/>
+              <a:gd name="connsiteX1" fmla="*/ 5508104 w 9144000"/>
+              <a:gd name="connsiteY1" fmla="*/ 1 h 6858001"/>
+              <a:gd name="connsiteX2" fmla="*/ 0 w 9144000"/>
+              <a:gd name="connsiteY2" fmla="*/ 0 h 6858001"/>
+              <a:gd name="connsiteX3" fmla="*/ 0 w 9144000"/>
+              <a:gd name="connsiteY3" fmla="*/ 6858001 h 6858001"/>
+              <a:gd name="connsiteX4" fmla="*/ 9144000 w 9144000"/>
+              <a:gd name="connsiteY4" fmla="*/ 6858000 h 6858001"/>
+              <a:gd name="connsiteX5" fmla="*/ 9144000 w 9144000"/>
+              <a:gd name="connsiteY5" fmla="*/ 3429000 h 6858001"/>
+              <a:gd name="connsiteX6" fmla="*/ 7956376 w 9144000"/>
+              <a:gd name="connsiteY6" fmla="*/ 2636913 h 6858001"/>
+              <a:gd name="connsiteX7" fmla="*/ 6372200 w 9144000"/>
+              <a:gd name="connsiteY7" fmla="*/ 2420889 h 6858001"/>
+              <a:gd name="connsiteX8" fmla="*/ 5436096 w 9144000"/>
+              <a:gd name="connsiteY8" fmla="*/ 1628801 h 6858001"/>
+              <a:gd name="connsiteX0" fmla="*/ 5436096 w 9144000"/>
+              <a:gd name="connsiteY0" fmla="*/ 1628801 h 6858001"/>
+              <a:gd name="connsiteX1" fmla="*/ 5508104 w 9144000"/>
+              <a:gd name="connsiteY1" fmla="*/ 1 h 6858001"/>
+              <a:gd name="connsiteX2" fmla="*/ 0 w 9144000"/>
+              <a:gd name="connsiteY2" fmla="*/ 0 h 6858001"/>
+              <a:gd name="connsiteX3" fmla="*/ 0 w 9144000"/>
+              <a:gd name="connsiteY3" fmla="*/ 6858001 h 6858001"/>
+              <a:gd name="connsiteX4" fmla="*/ 9144000 w 9144000"/>
+              <a:gd name="connsiteY4" fmla="*/ 6858000 h 6858001"/>
+              <a:gd name="connsiteX5" fmla="*/ 9144000 w 9144000"/>
+              <a:gd name="connsiteY5" fmla="*/ 3429000 h 6858001"/>
+              <a:gd name="connsiteX6" fmla="*/ 7740352 w 9144000"/>
+              <a:gd name="connsiteY6" fmla="*/ 2996953 h 6858001"/>
+              <a:gd name="connsiteX7" fmla="*/ 6372200 w 9144000"/>
+              <a:gd name="connsiteY7" fmla="*/ 2420889 h 6858001"/>
+              <a:gd name="connsiteX8" fmla="*/ 5436096 w 9144000"/>
+              <a:gd name="connsiteY8" fmla="*/ 1628801 h 6858001"/>
+              <a:gd name="connsiteX0" fmla="*/ 5436096 w 9144000"/>
+              <a:gd name="connsiteY0" fmla="*/ 1628801 h 6858001"/>
+              <a:gd name="connsiteX1" fmla="*/ 5508104 w 9144000"/>
+              <a:gd name="connsiteY1" fmla="*/ 1 h 6858001"/>
+              <a:gd name="connsiteX2" fmla="*/ 0 w 9144000"/>
+              <a:gd name="connsiteY2" fmla="*/ 0 h 6858001"/>
+              <a:gd name="connsiteX3" fmla="*/ 0 w 9144000"/>
+              <a:gd name="connsiteY3" fmla="*/ 6858001 h 6858001"/>
+              <a:gd name="connsiteX4" fmla="*/ 9144000 w 9144000"/>
+              <a:gd name="connsiteY4" fmla="*/ 6858000 h 6858001"/>
+              <a:gd name="connsiteX5" fmla="*/ 9144000 w 9144000"/>
+              <a:gd name="connsiteY5" fmla="*/ 3429000 h 6858001"/>
+              <a:gd name="connsiteX6" fmla="*/ 7740352 w 9144000"/>
+              <a:gd name="connsiteY6" fmla="*/ 2996953 h 6858001"/>
+              <a:gd name="connsiteX7" fmla="*/ 6804248 w 9144000"/>
+              <a:gd name="connsiteY7" fmla="*/ 2348881 h 6858001"/>
+              <a:gd name="connsiteX8" fmla="*/ 5436096 w 9144000"/>
+              <a:gd name="connsiteY8" fmla="*/ 1628801 h 6858001"/>
+              <a:gd name="connsiteX0" fmla="*/ 5436096 w 9144000"/>
+              <a:gd name="connsiteY0" fmla="*/ 1628801 h 6858001"/>
+              <a:gd name="connsiteX1" fmla="*/ 5508104 w 9144000"/>
+              <a:gd name="connsiteY1" fmla="*/ 1 h 6858001"/>
+              <a:gd name="connsiteX2" fmla="*/ 0 w 9144000"/>
+              <a:gd name="connsiteY2" fmla="*/ 0 h 6858001"/>
+              <a:gd name="connsiteX3" fmla="*/ 0 w 9144000"/>
+              <a:gd name="connsiteY3" fmla="*/ 6858001 h 6858001"/>
+              <a:gd name="connsiteX4" fmla="*/ 9144000 w 9144000"/>
+              <a:gd name="connsiteY4" fmla="*/ 6858000 h 6858001"/>
+              <a:gd name="connsiteX5" fmla="*/ 9144000 w 9144000"/>
+              <a:gd name="connsiteY5" fmla="*/ 3429000 h 6858001"/>
+              <a:gd name="connsiteX6" fmla="*/ 7740352 w 9144000"/>
+              <a:gd name="connsiteY6" fmla="*/ 2996953 h 6858001"/>
+              <a:gd name="connsiteX7" fmla="*/ 6804248 w 9144000"/>
+              <a:gd name="connsiteY7" fmla="*/ 2348881 h 6858001"/>
+              <a:gd name="connsiteX8" fmla="*/ 6156176 w 9144000"/>
+              <a:gd name="connsiteY8" fmla="*/ 1556793 h 6858001"/>
+              <a:gd name="connsiteX0" fmla="*/ 6156176 w 9144000"/>
+              <a:gd name="connsiteY0" fmla="*/ 1556793 h 6858001"/>
+              <a:gd name="connsiteX1" fmla="*/ 5508104 w 9144000"/>
+              <a:gd name="connsiteY1" fmla="*/ 1 h 6858001"/>
+              <a:gd name="connsiteX2" fmla="*/ 0 w 9144000"/>
+              <a:gd name="connsiteY2" fmla="*/ 0 h 6858001"/>
+              <a:gd name="connsiteX3" fmla="*/ 0 w 9144000"/>
+              <a:gd name="connsiteY3" fmla="*/ 6858001 h 6858001"/>
+              <a:gd name="connsiteX4" fmla="*/ 9144000 w 9144000"/>
+              <a:gd name="connsiteY4" fmla="*/ 6858000 h 6858001"/>
+              <a:gd name="connsiteX5" fmla="*/ 9144000 w 9144000"/>
+              <a:gd name="connsiteY5" fmla="*/ 3429000 h 6858001"/>
+              <a:gd name="connsiteX6" fmla="*/ 7740352 w 9144000"/>
+              <a:gd name="connsiteY6" fmla="*/ 2996953 h 6858001"/>
+              <a:gd name="connsiteX7" fmla="*/ 6804248 w 9144000"/>
+              <a:gd name="connsiteY7" fmla="*/ 2348881 h 6858001"/>
+              <a:gd name="connsiteX8" fmla="*/ 6156176 w 9144000"/>
+              <a:gd name="connsiteY8" fmla="*/ 1556793 h 6858001"/>
+              <a:gd name="connsiteX0" fmla="*/ 6156176 w 9144000"/>
+              <a:gd name="connsiteY0" fmla="*/ 1556793 h 6858001"/>
+              <a:gd name="connsiteX1" fmla="*/ 5508104 w 9144000"/>
+              <a:gd name="connsiteY1" fmla="*/ 1 h 6858001"/>
+              <a:gd name="connsiteX2" fmla="*/ 0 w 9144000"/>
+              <a:gd name="connsiteY2" fmla="*/ 0 h 6858001"/>
+              <a:gd name="connsiteX3" fmla="*/ 0 w 9144000"/>
+              <a:gd name="connsiteY3" fmla="*/ 6858001 h 6858001"/>
+              <a:gd name="connsiteX4" fmla="*/ 9144000 w 9144000"/>
+              <a:gd name="connsiteY4" fmla="*/ 6858000 h 6858001"/>
+              <a:gd name="connsiteX5" fmla="*/ 9144000 w 9144000"/>
+              <a:gd name="connsiteY5" fmla="*/ 3429000 h 6858001"/>
+              <a:gd name="connsiteX6" fmla="*/ 7740352 w 9144000"/>
+              <a:gd name="connsiteY6" fmla="*/ 2996953 h 6858001"/>
+              <a:gd name="connsiteX7" fmla="*/ 6804248 w 9144000"/>
+              <a:gd name="connsiteY7" fmla="*/ 2348881 h 6858001"/>
+              <a:gd name="connsiteX8" fmla="*/ 6156176 w 9144000"/>
+              <a:gd name="connsiteY8" fmla="*/ 1556793 h 6858001"/>
+              <a:gd name="connsiteX0" fmla="*/ 6156176 w 9144000"/>
+              <a:gd name="connsiteY0" fmla="*/ 1556793 h 6858001"/>
+              <a:gd name="connsiteX1" fmla="*/ 4499992 w 9144000"/>
+              <a:gd name="connsiteY1" fmla="*/ 1 h 6858001"/>
+              <a:gd name="connsiteX2" fmla="*/ 0 w 9144000"/>
+              <a:gd name="connsiteY2" fmla="*/ 0 h 6858001"/>
+              <a:gd name="connsiteX3" fmla="*/ 0 w 9144000"/>
+              <a:gd name="connsiteY3" fmla="*/ 6858001 h 6858001"/>
+              <a:gd name="connsiteX4" fmla="*/ 9144000 w 9144000"/>
+              <a:gd name="connsiteY4" fmla="*/ 6858000 h 6858001"/>
+              <a:gd name="connsiteX5" fmla="*/ 9144000 w 9144000"/>
+              <a:gd name="connsiteY5" fmla="*/ 3429000 h 6858001"/>
+              <a:gd name="connsiteX6" fmla="*/ 7740352 w 9144000"/>
+              <a:gd name="connsiteY6" fmla="*/ 2996953 h 6858001"/>
+              <a:gd name="connsiteX7" fmla="*/ 6804248 w 9144000"/>
+              <a:gd name="connsiteY7" fmla="*/ 2348881 h 6858001"/>
+              <a:gd name="connsiteX8" fmla="*/ 6156176 w 9144000"/>
+              <a:gd name="connsiteY8" fmla="*/ 1556793 h 6858001"/>
+              <a:gd name="connsiteX0" fmla="*/ 6156176 w 9144000"/>
+              <a:gd name="connsiteY0" fmla="*/ 1556793 h 6858001"/>
+              <a:gd name="connsiteX1" fmla="*/ 4499992 w 9144000"/>
+              <a:gd name="connsiteY1" fmla="*/ 1 h 6858001"/>
+              <a:gd name="connsiteX2" fmla="*/ 0 w 9144000"/>
+              <a:gd name="connsiteY2" fmla="*/ 0 h 6858001"/>
+              <a:gd name="connsiteX3" fmla="*/ 0 w 9144000"/>
+              <a:gd name="connsiteY3" fmla="*/ 6858001 h 6858001"/>
+              <a:gd name="connsiteX4" fmla="*/ 9144000 w 9144000"/>
+              <a:gd name="connsiteY4" fmla="*/ 6858000 h 6858001"/>
+              <a:gd name="connsiteX5" fmla="*/ 9144000 w 9144000"/>
+              <a:gd name="connsiteY5" fmla="*/ 3429000 h 6858001"/>
+              <a:gd name="connsiteX6" fmla="*/ 7740352 w 9144000"/>
+              <a:gd name="connsiteY6" fmla="*/ 2996953 h 6858001"/>
+              <a:gd name="connsiteX7" fmla="*/ 6804248 w 9144000"/>
+              <a:gd name="connsiteY7" fmla="*/ 2348881 h 6858001"/>
+              <a:gd name="connsiteX8" fmla="*/ 5292080 w 9144000"/>
+              <a:gd name="connsiteY8" fmla="*/ 1700809 h 6858001"/>
+              <a:gd name="connsiteX0" fmla="*/ 5292080 w 9144000"/>
+              <a:gd name="connsiteY0" fmla="*/ 1700809 h 6858001"/>
+              <a:gd name="connsiteX1" fmla="*/ 4499992 w 9144000"/>
+              <a:gd name="connsiteY1" fmla="*/ 1 h 6858001"/>
+              <a:gd name="connsiteX2" fmla="*/ 0 w 9144000"/>
+              <a:gd name="connsiteY2" fmla="*/ 0 h 6858001"/>
+              <a:gd name="connsiteX3" fmla="*/ 0 w 9144000"/>
+              <a:gd name="connsiteY3" fmla="*/ 6858001 h 6858001"/>
+              <a:gd name="connsiteX4" fmla="*/ 9144000 w 9144000"/>
+              <a:gd name="connsiteY4" fmla="*/ 6858000 h 6858001"/>
+              <a:gd name="connsiteX5" fmla="*/ 9144000 w 9144000"/>
+              <a:gd name="connsiteY5" fmla="*/ 3429000 h 6858001"/>
+              <a:gd name="connsiteX6" fmla="*/ 7740352 w 9144000"/>
+              <a:gd name="connsiteY6" fmla="*/ 2996953 h 6858001"/>
+              <a:gd name="connsiteX7" fmla="*/ 6804248 w 9144000"/>
+              <a:gd name="connsiteY7" fmla="*/ 2348881 h 6858001"/>
+              <a:gd name="connsiteX8" fmla="*/ 5292080 w 9144000"/>
+              <a:gd name="connsiteY8" fmla="*/ 1700809 h 6858001"/>
+              <a:gd name="connsiteX0" fmla="*/ 5292080 w 9144000"/>
+              <a:gd name="connsiteY0" fmla="*/ 1700809 h 6858001"/>
+              <a:gd name="connsiteX1" fmla="*/ 4499992 w 9144000"/>
+              <a:gd name="connsiteY1" fmla="*/ 1 h 6858001"/>
+              <a:gd name="connsiteX2" fmla="*/ 0 w 9144000"/>
+              <a:gd name="connsiteY2" fmla="*/ 0 h 6858001"/>
+              <a:gd name="connsiteX3" fmla="*/ 0 w 9144000"/>
+              <a:gd name="connsiteY3" fmla="*/ 6858001 h 6858001"/>
+              <a:gd name="connsiteX4" fmla="*/ 9144000 w 9144000"/>
+              <a:gd name="connsiteY4" fmla="*/ 6858000 h 6858001"/>
+              <a:gd name="connsiteX5" fmla="*/ 9144000 w 9144000"/>
+              <a:gd name="connsiteY5" fmla="*/ 3429000 h 6858001"/>
+              <a:gd name="connsiteX6" fmla="*/ 7740352 w 9144000"/>
+              <a:gd name="connsiteY6" fmla="*/ 2996953 h 6858001"/>
+              <a:gd name="connsiteX7" fmla="*/ 6300192 w 9144000"/>
+              <a:gd name="connsiteY7" fmla="*/ 2996953 h 6858001"/>
+              <a:gd name="connsiteX8" fmla="*/ 5292080 w 9144000"/>
+              <a:gd name="connsiteY8" fmla="*/ 1700809 h 6858001"/>
+              <a:gd name="connsiteX0" fmla="*/ 5292080 w 9144000"/>
+              <a:gd name="connsiteY0" fmla="*/ 1700809 h 6858001"/>
+              <a:gd name="connsiteX1" fmla="*/ 4499992 w 9144000"/>
+              <a:gd name="connsiteY1" fmla="*/ 1 h 6858001"/>
+              <a:gd name="connsiteX2" fmla="*/ 0 w 9144000"/>
+              <a:gd name="connsiteY2" fmla="*/ 0 h 6858001"/>
+              <a:gd name="connsiteX3" fmla="*/ 0 w 9144000"/>
+              <a:gd name="connsiteY3" fmla="*/ 6858001 h 6858001"/>
+              <a:gd name="connsiteX4" fmla="*/ 9144000 w 9144000"/>
+              <a:gd name="connsiteY4" fmla="*/ 6858000 h 6858001"/>
+              <a:gd name="connsiteX5" fmla="*/ 9144000 w 9144000"/>
+              <a:gd name="connsiteY5" fmla="*/ 3429000 h 6858001"/>
+              <a:gd name="connsiteX6" fmla="*/ 7596336 w 9144000"/>
+              <a:gd name="connsiteY6" fmla="*/ 3429001 h 6858001"/>
+              <a:gd name="connsiteX7" fmla="*/ 6300192 w 9144000"/>
+              <a:gd name="connsiteY7" fmla="*/ 2996953 h 6858001"/>
+              <a:gd name="connsiteX8" fmla="*/ 5292080 w 9144000"/>
+              <a:gd name="connsiteY8" fmla="*/ 1700809 h 6858001"/>
+              <a:gd name="connsiteX0" fmla="*/ 5292080 w 9144000"/>
+              <a:gd name="connsiteY0" fmla="*/ 1700809 h 6858001"/>
+              <a:gd name="connsiteX1" fmla="*/ 4499992 w 9144000"/>
+              <a:gd name="connsiteY1" fmla="*/ 1 h 6858001"/>
+              <a:gd name="connsiteX2" fmla="*/ 0 w 9144000"/>
+              <a:gd name="connsiteY2" fmla="*/ 0 h 6858001"/>
+              <a:gd name="connsiteX3" fmla="*/ 0 w 9144000"/>
+              <a:gd name="connsiteY3" fmla="*/ 6858001 h 6858001"/>
+              <a:gd name="connsiteX4" fmla="*/ 9144000 w 9144000"/>
+              <a:gd name="connsiteY4" fmla="*/ 6858000 h 6858001"/>
+              <a:gd name="connsiteX5" fmla="*/ 9144000 w 9144000"/>
+              <a:gd name="connsiteY5" fmla="*/ 3429000 h 6858001"/>
+              <a:gd name="connsiteX6" fmla="*/ 7596336 w 9144000"/>
+              <a:gd name="connsiteY6" fmla="*/ 3429001 h 6858001"/>
+              <a:gd name="connsiteX7" fmla="*/ 6300192 w 9144000"/>
+              <a:gd name="connsiteY7" fmla="*/ 2996953 h 6858001"/>
+              <a:gd name="connsiteX8" fmla="*/ 5292080 w 9144000"/>
+              <a:gd name="connsiteY8" fmla="*/ 1700809 h 6858001"/>
+              <a:gd name="connsiteX0" fmla="*/ 5292080 w 9144000"/>
+              <a:gd name="connsiteY0" fmla="*/ 1700809 h 6858001"/>
+              <a:gd name="connsiteX1" fmla="*/ 4499992 w 9144000"/>
+              <a:gd name="connsiteY1" fmla="*/ 1 h 6858001"/>
+              <a:gd name="connsiteX2" fmla="*/ 0 w 9144000"/>
+              <a:gd name="connsiteY2" fmla="*/ 0 h 6858001"/>
+              <a:gd name="connsiteX3" fmla="*/ 0 w 9144000"/>
+              <a:gd name="connsiteY3" fmla="*/ 6858001 h 6858001"/>
+              <a:gd name="connsiteX4" fmla="*/ 9144000 w 9144000"/>
+              <a:gd name="connsiteY4" fmla="*/ 6858000 h 6858001"/>
+              <a:gd name="connsiteX5" fmla="*/ 9144000 w 9144000"/>
+              <a:gd name="connsiteY5" fmla="*/ 4005065 h 6858001"/>
+              <a:gd name="connsiteX6" fmla="*/ 7596336 w 9144000"/>
+              <a:gd name="connsiteY6" fmla="*/ 3429001 h 6858001"/>
+              <a:gd name="connsiteX7" fmla="*/ 6300192 w 9144000"/>
+              <a:gd name="connsiteY7" fmla="*/ 2996953 h 6858001"/>
+              <a:gd name="connsiteX8" fmla="*/ 5292080 w 9144000"/>
+              <a:gd name="connsiteY8" fmla="*/ 1700809 h 6858001"/>
+              <a:gd name="connsiteX0" fmla="*/ 5292080 w 9144000"/>
+              <a:gd name="connsiteY0" fmla="*/ 1700809 h 6858001"/>
+              <a:gd name="connsiteX1" fmla="*/ 4499992 w 9144000"/>
+              <a:gd name="connsiteY1" fmla="*/ 1 h 6858001"/>
+              <a:gd name="connsiteX2" fmla="*/ 0 w 9144000"/>
+              <a:gd name="connsiteY2" fmla="*/ 0 h 6858001"/>
+              <a:gd name="connsiteX3" fmla="*/ 0 w 9144000"/>
+              <a:gd name="connsiteY3" fmla="*/ 6858001 h 6858001"/>
+              <a:gd name="connsiteX4" fmla="*/ 9144000 w 9144000"/>
+              <a:gd name="connsiteY4" fmla="*/ 6858000 h 6858001"/>
+              <a:gd name="connsiteX5" fmla="*/ 9144000 w 9144000"/>
+              <a:gd name="connsiteY5" fmla="*/ 4005065 h 6858001"/>
+              <a:gd name="connsiteX6" fmla="*/ 7812360 w 9144000"/>
+              <a:gd name="connsiteY6" fmla="*/ 3861049 h 6858001"/>
+              <a:gd name="connsiteX7" fmla="*/ 6300192 w 9144000"/>
+              <a:gd name="connsiteY7" fmla="*/ 2996953 h 6858001"/>
+              <a:gd name="connsiteX8" fmla="*/ 5292080 w 9144000"/>
+              <a:gd name="connsiteY8" fmla="*/ 1700809 h 6858001"/>
+              <a:gd name="connsiteX0" fmla="*/ 5292080 w 9144000"/>
+              <a:gd name="connsiteY0" fmla="*/ 1700809 h 6858001"/>
+              <a:gd name="connsiteX1" fmla="*/ 4499992 w 9144000"/>
+              <a:gd name="connsiteY1" fmla="*/ 1 h 6858001"/>
+              <a:gd name="connsiteX2" fmla="*/ 0 w 9144000"/>
+              <a:gd name="connsiteY2" fmla="*/ 0 h 6858001"/>
+              <a:gd name="connsiteX3" fmla="*/ 0 w 9144000"/>
+              <a:gd name="connsiteY3" fmla="*/ 6858001 h 6858001"/>
+              <a:gd name="connsiteX4" fmla="*/ 9144000 w 9144000"/>
+              <a:gd name="connsiteY4" fmla="*/ 6858000 h 6858001"/>
+              <a:gd name="connsiteX5" fmla="*/ 9144000 w 9144000"/>
+              <a:gd name="connsiteY5" fmla="*/ 4005065 h 6858001"/>
+              <a:gd name="connsiteX6" fmla="*/ 7812360 w 9144000"/>
+              <a:gd name="connsiteY6" fmla="*/ 3861049 h 6858001"/>
+              <a:gd name="connsiteX7" fmla="*/ 6012160 w 9144000"/>
+              <a:gd name="connsiteY7" fmla="*/ 3212977 h 6858001"/>
+              <a:gd name="connsiteX8" fmla="*/ 5292080 w 9144000"/>
+              <a:gd name="connsiteY8" fmla="*/ 1700809 h 6858001"/>
+              <a:gd name="connsiteX0" fmla="*/ 5292080 w 9144000"/>
+              <a:gd name="connsiteY0" fmla="*/ 1700809 h 6858001"/>
+              <a:gd name="connsiteX1" fmla="*/ 4499992 w 9144000"/>
+              <a:gd name="connsiteY1" fmla="*/ 1 h 6858001"/>
+              <a:gd name="connsiteX2" fmla="*/ 0 w 9144000"/>
+              <a:gd name="connsiteY2" fmla="*/ 0 h 6858001"/>
+              <a:gd name="connsiteX3" fmla="*/ 0 w 9144000"/>
+              <a:gd name="connsiteY3" fmla="*/ 6858001 h 6858001"/>
+              <a:gd name="connsiteX4" fmla="*/ 9144000 w 9144000"/>
+              <a:gd name="connsiteY4" fmla="*/ 6858000 h 6858001"/>
+              <a:gd name="connsiteX5" fmla="*/ 9144000 w 9144000"/>
+              <a:gd name="connsiteY5" fmla="*/ 5229201 h 6858001"/>
+              <a:gd name="connsiteX6" fmla="*/ 7812360 w 9144000"/>
+              <a:gd name="connsiteY6" fmla="*/ 3861049 h 6858001"/>
+              <a:gd name="connsiteX7" fmla="*/ 6012160 w 9144000"/>
+              <a:gd name="connsiteY7" fmla="*/ 3212977 h 6858001"/>
+              <a:gd name="connsiteX8" fmla="*/ 5292080 w 9144000"/>
+              <a:gd name="connsiteY8" fmla="*/ 1700809 h 6858001"/>
+              <a:gd name="connsiteX0" fmla="*/ 5292080 w 9144000"/>
+              <a:gd name="connsiteY0" fmla="*/ 1700809 h 6858001"/>
+              <a:gd name="connsiteX1" fmla="*/ 4499992 w 9144000"/>
+              <a:gd name="connsiteY1" fmla="*/ 1 h 6858001"/>
+              <a:gd name="connsiteX2" fmla="*/ 0 w 9144000"/>
+              <a:gd name="connsiteY2" fmla="*/ 0 h 6858001"/>
+              <a:gd name="connsiteX3" fmla="*/ 0 w 9144000"/>
+              <a:gd name="connsiteY3" fmla="*/ 6858001 h 6858001"/>
+              <a:gd name="connsiteX4" fmla="*/ 9144000 w 9144000"/>
+              <a:gd name="connsiteY4" fmla="*/ 6858000 h 6858001"/>
+              <a:gd name="connsiteX5" fmla="*/ 9144000 w 9144000"/>
+              <a:gd name="connsiteY5" fmla="*/ 5229201 h 6858001"/>
+              <a:gd name="connsiteX6" fmla="*/ 6660232 w 9144000"/>
+              <a:gd name="connsiteY6" fmla="*/ 4653137 h 6858001"/>
+              <a:gd name="connsiteX7" fmla="*/ 6012160 w 9144000"/>
+              <a:gd name="connsiteY7" fmla="*/ 3212977 h 6858001"/>
+              <a:gd name="connsiteX8" fmla="*/ 5292080 w 9144000"/>
+              <a:gd name="connsiteY8" fmla="*/ 1700809 h 6858001"/>
+              <a:gd name="connsiteX0" fmla="*/ 5292080 w 9144000"/>
+              <a:gd name="connsiteY0" fmla="*/ 1700809 h 6858001"/>
+              <a:gd name="connsiteX1" fmla="*/ 4860032 w 9144000"/>
+              <a:gd name="connsiteY1" fmla="*/ 836713 h 6858001"/>
+              <a:gd name="connsiteX2" fmla="*/ 4499992 w 9144000"/>
+              <a:gd name="connsiteY2" fmla="*/ 1 h 6858001"/>
+              <a:gd name="connsiteX3" fmla="*/ 0 w 9144000"/>
+              <a:gd name="connsiteY3" fmla="*/ 0 h 6858001"/>
+              <a:gd name="connsiteX4" fmla="*/ 0 w 9144000"/>
+              <a:gd name="connsiteY4" fmla="*/ 6858001 h 6858001"/>
+              <a:gd name="connsiteX5" fmla="*/ 9144000 w 9144000"/>
+              <a:gd name="connsiteY5" fmla="*/ 6858000 h 6858001"/>
+              <a:gd name="connsiteX6" fmla="*/ 9144000 w 9144000"/>
+              <a:gd name="connsiteY6" fmla="*/ 5229201 h 6858001"/>
+              <a:gd name="connsiteX7" fmla="*/ 6660232 w 9144000"/>
+              <a:gd name="connsiteY7" fmla="*/ 4653137 h 6858001"/>
+              <a:gd name="connsiteX8" fmla="*/ 6012160 w 9144000"/>
+              <a:gd name="connsiteY8" fmla="*/ 3212977 h 6858001"/>
+              <a:gd name="connsiteX9" fmla="*/ 5292080 w 9144000"/>
+              <a:gd name="connsiteY9" fmla="*/ 1700809 h 6858001"/>
+              <a:gd name="connsiteX0" fmla="*/ 5292080 w 9144000"/>
+              <a:gd name="connsiteY0" fmla="*/ 1700809 h 6858001"/>
+              <a:gd name="connsiteX1" fmla="*/ 4860032 w 9144000"/>
+              <a:gd name="connsiteY1" fmla="*/ 836713 h 6858001"/>
+              <a:gd name="connsiteX2" fmla="*/ 4499992 w 9144000"/>
+              <a:gd name="connsiteY2" fmla="*/ 1 h 6858001"/>
+              <a:gd name="connsiteX3" fmla="*/ 0 w 9144000"/>
+              <a:gd name="connsiteY3" fmla="*/ 0 h 6858001"/>
+              <a:gd name="connsiteX4" fmla="*/ 0 w 9144000"/>
+              <a:gd name="connsiteY4" fmla="*/ 6858001 h 6858001"/>
+              <a:gd name="connsiteX5" fmla="*/ 9144000 w 9144000"/>
+              <a:gd name="connsiteY5" fmla="*/ 6858000 h 6858001"/>
+              <a:gd name="connsiteX6" fmla="*/ 9144000 w 9144000"/>
+              <a:gd name="connsiteY6" fmla="*/ 5229201 h 6858001"/>
+              <a:gd name="connsiteX7" fmla="*/ 6660232 w 9144000"/>
+              <a:gd name="connsiteY7" fmla="*/ 4653137 h 6858001"/>
+              <a:gd name="connsiteX8" fmla="*/ 6012160 w 9144000"/>
+              <a:gd name="connsiteY8" fmla="*/ 3212977 h 6858001"/>
+              <a:gd name="connsiteX9" fmla="*/ 5292080 w 9144000"/>
+              <a:gd name="connsiteY9" fmla="*/ 1700809 h 6858001"/>
+              <a:gd name="connsiteX0" fmla="*/ 5292080 w 9144000"/>
+              <a:gd name="connsiteY0" fmla="*/ 1700809 h 6858001"/>
+              <a:gd name="connsiteX1" fmla="*/ 4860032 w 9144000"/>
+              <a:gd name="connsiteY1" fmla="*/ 836713 h 6858001"/>
+              <a:gd name="connsiteX2" fmla="*/ 4499992 w 9144000"/>
+              <a:gd name="connsiteY2" fmla="*/ 1 h 6858001"/>
+              <a:gd name="connsiteX3" fmla="*/ 0 w 9144000"/>
+              <a:gd name="connsiteY3" fmla="*/ 0 h 6858001"/>
+              <a:gd name="connsiteX4" fmla="*/ 0 w 9144000"/>
+              <a:gd name="connsiteY4" fmla="*/ 6858001 h 6858001"/>
+              <a:gd name="connsiteX5" fmla="*/ 9144000 w 9144000"/>
+              <a:gd name="connsiteY5" fmla="*/ 6858000 h 6858001"/>
+              <a:gd name="connsiteX6" fmla="*/ 9144000 w 9144000"/>
+              <a:gd name="connsiteY6" fmla="*/ 5229201 h 6858001"/>
+              <a:gd name="connsiteX7" fmla="*/ 6660232 w 9144000"/>
+              <a:gd name="connsiteY7" fmla="*/ 4653137 h 6858001"/>
+              <a:gd name="connsiteX8" fmla="*/ 6012160 w 9144000"/>
+              <a:gd name="connsiteY8" fmla="*/ 3212977 h 6858001"/>
+              <a:gd name="connsiteX9" fmla="*/ 5292080 w 9144000"/>
+              <a:gd name="connsiteY9" fmla="*/ 1700809 h 6858001"/>
+              <a:gd name="connsiteX0" fmla="*/ 5292080 w 9144000"/>
+              <a:gd name="connsiteY0" fmla="*/ 1700809 h 6858001"/>
+              <a:gd name="connsiteX1" fmla="*/ 4499992 w 9144000"/>
+              <a:gd name="connsiteY1" fmla="*/ 1 h 6858001"/>
+              <a:gd name="connsiteX2" fmla="*/ 0 w 9144000"/>
+              <a:gd name="connsiteY2" fmla="*/ 0 h 6858001"/>
+              <a:gd name="connsiteX3" fmla="*/ 0 w 9144000"/>
+              <a:gd name="connsiteY3" fmla="*/ 6858001 h 6858001"/>
+              <a:gd name="connsiteX4" fmla="*/ 9144000 w 9144000"/>
+              <a:gd name="connsiteY4" fmla="*/ 6858000 h 6858001"/>
+              <a:gd name="connsiteX5" fmla="*/ 9144000 w 9144000"/>
+              <a:gd name="connsiteY5" fmla="*/ 5229201 h 6858001"/>
+              <a:gd name="connsiteX6" fmla="*/ 6660232 w 9144000"/>
+              <a:gd name="connsiteY6" fmla="*/ 4653137 h 6858001"/>
+              <a:gd name="connsiteX7" fmla="*/ 6012160 w 9144000"/>
+              <a:gd name="connsiteY7" fmla="*/ 3212977 h 6858001"/>
+              <a:gd name="connsiteX8" fmla="*/ 5292080 w 9144000"/>
+              <a:gd name="connsiteY8" fmla="*/ 1700809 h 6858001"/>
+              <a:gd name="connsiteX0" fmla="*/ 5292080 w 9144000"/>
+              <a:gd name="connsiteY0" fmla="*/ 1700809 h 6858001"/>
+              <a:gd name="connsiteX1" fmla="*/ 4499992 w 9144000"/>
+              <a:gd name="connsiteY1" fmla="*/ 1 h 6858001"/>
+              <a:gd name="connsiteX2" fmla="*/ 0 w 9144000"/>
+              <a:gd name="connsiteY2" fmla="*/ 0 h 6858001"/>
+              <a:gd name="connsiteX3" fmla="*/ 0 w 9144000"/>
+              <a:gd name="connsiteY3" fmla="*/ 6858001 h 6858001"/>
+              <a:gd name="connsiteX4" fmla="*/ 9144000 w 9144000"/>
+              <a:gd name="connsiteY4" fmla="*/ 6858000 h 6858001"/>
+              <a:gd name="connsiteX5" fmla="*/ 9144000 w 9144000"/>
+              <a:gd name="connsiteY5" fmla="*/ 5229201 h 6858001"/>
+              <a:gd name="connsiteX6" fmla="*/ 6660232 w 9144000"/>
+              <a:gd name="connsiteY6" fmla="*/ 4653137 h 6858001"/>
+              <a:gd name="connsiteX7" fmla="*/ 6012160 w 9144000"/>
+              <a:gd name="connsiteY7" fmla="*/ 3212977 h 6858001"/>
+              <a:gd name="connsiteX8" fmla="*/ 5292080 w 9144000"/>
+              <a:gd name="connsiteY8" fmla="*/ 1700809 h 6858001"/>
+              <a:gd name="connsiteX0" fmla="*/ 5292080 w 9144000"/>
+              <a:gd name="connsiteY0" fmla="*/ 1700809 h 6858001"/>
+              <a:gd name="connsiteX1" fmla="*/ 4499992 w 9144000"/>
+              <a:gd name="connsiteY1" fmla="*/ 1 h 6858001"/>
+              <a:gd name="connsiteX2" fmla="*/ 0 w 9144000"/>
+              <a:gd name="connsiteY2" fmla="*/ 0 h 6858001"/>
+              <a:gd name="connsiteX3" fmla="*/ 0 w 9144000"/>
+              <a:gd name="connsiteY3" fmla="*/ 6858001 h 6858001"/>
+              <a:gd name="connsiteX4" fmla="*/ 9144000 w 9144000"/>
+              <a:gd name="connsiteY4" fmla="*/ 6858000 h 6858001"/>
+              <a:gd name="connsiteX5" fmla="*/ 9144000 w 9144000"/>
+              <a:gd name="connsiteY5" fmla="*/ 5229201 h 6858001"/>
+              <a:gd name="connsiteX6" fmla="*/ 6660232 w 9144000"/>
+              <a:gd name="connsiteY6" fmla="*/ 4653137 h 6858001"/>
+              <a:gd name="connsiteX7" fmla="*/ 6012160 w 9144000"/>
+              <a:gd name="connsiteY7" fmla="*/ 3212977 h 6858001"/>
+              <a:gd name="connsiteX8" fmla="*/ 5292080 w 9144000"/>
+              <a:gd name="connsiteY8" fmla="*/ 1700809 h 6858001"/>
+            </a:gdLst>
+            <a:ahLst/>
+            <a:cxnLst>
+              <a:cxn ang="0">
+                <a:pos x="connsiteX0" y="connsiteY0"/>
+              </a:cxn>
+              <a:cxn ang="0">
+                <a:pos x="connsiteX1" y="connsiteY1"/>
+              </a:cxn>
+              <a:cxn ang="0">
+                <a:pos x="connsiteX2" y="connsiteY2"/>
+              </a:cxn>
+              <a:cxn ang="0">
+                <a:pos x="connsiteX3" y="connsiteY3"/>
+              </a:cxn>
+              <a:cxn ang="0">
+                <a:pos x="connsiteX4" y="connsiteY4"/>
+              </a:cxn>
+              <a:cxn ang="0">
+                <a:pos x="connsiteX5" y="connsiteY5"/>
+              </a:cxn>
+              <a:cxn ang="0">
+                <a:pos x="connsiteX6" y="connsiteY6"/>
+              </a:cxn>
+              <a:cxn ang="0">
+                <a:pos x="connsiteX7" y="connsiteY7"/>
+              </a:cxn>
+              <a:cxn ang="0">
+                <a:pos x="connsiteX8" y="connsiteY8"/>
+              </a:cxn>
+            </a:cxnLst>
+            <a:rect l="l" t="t" r="r" b="b"/>
+            <a:pathLst>
+              <a:path w="9144000" h="6858001">
+                <a:moveTo>
+                  <a:pt x="5292080" y="1700809"/>
+                </a:moveTo>
+                <a:cubicBezTo>
+                  <a:pt x="5184741" y="1155916"/>
+                  <a:pt x="5382005" y="283469"/>
+                  <a:pt x="4499992" y="1"/>
+                </a:cubicBezTo>
+                <a:lnTo>
+                  <a:pt x="0" y="0"/>
+                </a:lnTo>
+                <a:cubicBezTo>
+                  <a:pt x="488" y="1042914"/>
+                  <a:pt x="3645" y="5710973"/>
+                  <a:pt x="0" y="6858001"/>
+                </a:cubicBezTo>
+                <a:lnTo>
+                  <a:pt x="9144000" y="6858000"/>
+                </a:lnTo>
+                <a:cubicBezTo>
+                  <a:pt x="9140355" y="5587171"/>
+                  <a:pt x="9122038" y="6129298"/>
+                  <a:pt x="9144000" y="5229201"/>
+                </a:cubicBezTo>
+                <a:cubicBezTo>
+                  <a:pt x="8481120" y="4846687"/>
+                  <a:pt x="7182205" y="4989174"/>
+                  <a:pt x="6660232" y="4653137"/>
+                </a:cubicBezTo>
+                <a:cubicBezTo>
+                  <a:pt x="6138259" y="4317100"/>
+                  <a:pt x="6240185" y="3705032"/>
+                  <a:pt x="6012160" y="3212977"/>
+                </a:cubicBezTo>
+                <a:cubicBezTo>
+                  <a:pt x="5784135" y="2720922"/>
+                  <a:pt x="5301494" y="2227548"/>
+                  <a:pt x="5292080" y="1700809"/>
+                </a:cubicBezTo>
+              </a:path>
+            </a:pathLst>
+          </a:custGeom>
+          <a:solidFill>
+            <a:schemeClr val="accent1">
+              <a:lumMod val="20000"/>
+              <a:lumOff val="80000"/>
+            </a:schemeClr>
+          </a:solidFill>
+        </p:spPr>
+        <p:style>
+          <a:lnRef idx="1">
+            <a:schemeClr val="accent1"/>
+          </a:lnRef>
+          <a:fillRef idx="0">
+            <a:schemeClr val="accent1"/>
+          </a:fillRef>
+          <a:effectRef idx="0">
+            <a:schemeClr val="accent1"/>
+          </a:effectRef>
+          <a:fontRef idx="minor">
+            <a:schemeClr val="tx1"/>
+          </a:fontRef>
+        </p:style>
+        <p:txBody>
+          <a:bodyPr rtlCol="0" anchor="ctr"/>
+          <a:lstStyle/>
+          <a:p>
+            <a:pPr algn="ctr"/>
+            <a:endParaRPr lang="en-GB" dirty="0"/>
+          </a:p>
+        </p:txBody>
+      </p:sp>
+      <p:sp>
+        <p:nvSpPr>
+          <p:cNvPr id="10" name="TextBox 9"/>
+          <p:cNvSpPr txBox="1"/>
+          <p:nvPr/>
+        </p:nvSpPr>
+        <p:spPr>
+          <a:xfrm>
+            <a:off x="0" y="0"/>
+            <a:ext cx="686406" cy="307777"/>
+          </a:xfrm>
+          <a:prstGeom prst="rect">
+            <a:avLst/>
+          </a:prstGeom>
+          <a:noFill/>
+        </p:spPr>
+        <p:txBody>
+          <a:bodyPr wrap="none" rtlCol="0">
+            <a:spAutoFit/>
+          </a:bodyPr>
+          <a:lstStyle/>
+          <a:p>
+            <a:r>
+              <a:rPr lang="en-US" sz="1400" b="1" dirty="0" smtClean="0"/>
+              <a:t>INSIDE</a:t>
+            </a:r>
+            <a:endParaRPr lang="en-US" sz="1400" b="1" dirty="0"/>
+          </a:p>
+        </p:txBody>
+      </p:sp>
+      <p:cxnSp>
+        <p:nvCxnSpPr>
+          <p:cNvPr id="15" name="Straight Arrow Connector 14"/>
+          <p:cNvCxnSpPr/>
+          <p:nvPr/>
+        </p:nvCxnSpPr>
+        <p:spPr>
+          <a:xfrm flipV="1">
+            <a:off x="2267744" y="4005064"/>
+            <a:ext cx="1080120" cy="1187624"/>
+          </a:xfrm>
+          <a:prstGeom prst="straightConnector1">
+            <a:avLst/>
+          </a:prstGeom>
+          <a:ln w="28575">
+            <a:tailEnd type="arrow"/>
+          </a:ln>
+        </p:spPr>
+        <p:style>
+          <a:lnRef idx="1">
+            <a:schemeClr val="accent1"/>
+          </a:lnRef>
+          <a:fillRef idx="0">
+            <a:schemeClr val="accent1"/>
+          </a:fillRef>
+          <a:effectRef idx="0">
+            <a:schemeClr val="accent1"/>
+          </a:effectRef>
+          <a:fontRef idx="minor">
+            <a:schemeClr val="tx1"/>
+          </a:fontRef>
+        </p:style>
+      </p:cxnSp>
+      <p:cxnSp>
+        <p:nvCxnSpPr>
+          <p:cNvPr id="23" name="Straight Arrow Connector 22"/>
+          <p:cNvCxnSpPr>
+            <a:stCxn id="3" idx="3"/>
+            <a:endCxn id="1029" idx="1"/>
+          </p:cNvCxnSpPr>
+          <p:nvPr/>
+        </p:nvCxnSpPr>
+        <p:spPr>
+          <a:xfrm>
+            <a:off x="4220143" y="3717032"/>
+            <a:ext cx="3304185" cy="0"/>
+          </a:xfrm>
+          <a:prstGeom prst="straightConnector1">
+            <a:avLst/>
+          </a:prstGeom>
+          <a:ln w="28575">
+            <a:solidFill>
+              <a:srgbClr val="FF0000"/>
+            </a:solidFill>
+            <a:tailEnd type="arrow"/>
+          </a:ln>
+        </p:spPr>
+        <p:style>
+          <a:lnRef idx="1">
+            <a:schemeClr val="accent1"/>
+          </a:lnRef>
+          <a:fillRef idx="0">
+            <a:schemeClr val="accent1"/>
+          </a:fillRef>
+          <a:effectRef idx="0">
+            <a:schemeClr val="accent1"/>
+          </a:effectRef>
+          <a:fontRef idx="minor">
+            <a:schemeClr val="tx1"/>
+          </a:fontRef>
+        </p:style>
+      </p:cxnSp>
+      <p:pic>
+        <p:nvPicPr>
+          <p:cNvPr id="2" name="Picture 3" descr="\\global.scd.scania.com\home\Se\046\sssttn\Documents\My Pictures\Server0.png"/>
+          <p:cNvPicPr>
+            <a:picLocks noChangeAspect="1" noChangeArrowheads="1"/>
+          </p:cNvPicPr>
+          <p:nvPr/>
+        </p:nvPicPr>
+        <p:blipFill>
+          <a:blip r:embed="rId2" cstate="print"/>
+          <a:srcRect/>
+          <a:stretch>
+            <a:fillRect/>
+          </a:stretch>
+        </p:blipFill>
+        <p:spPr bwMode="auto">
+          <a:xfrm>
+            <a:off x="1331640" y="5229200"/>
+            <a:ext cx="1088303" cy="1008112"/>
+          </a:xfrm>
+          <a:prstGeom prst="rect">
+            <a:avLst/>
+          </a:prstGeom>
+          <a:noFill/>
+        </p:spPr>
+      </p:pic>
+      <p:pic>
+        <p:nvPicPr>
+          <p:cNvPr id="3" name="Picture 4" descr="\\global.scd.scania.com\home\Se\046\sssttn\Documents\My Pictures\Server.png"/>
+          <p:cNvPicPr>
+            <a:picLocks noChangeAspect="1" noChangeArrowheads="1"/>
+          </p:cNvPicPr>
+          <p:nvPr/>
+        </p:nvPicPr>
+        <p:blipFill>
+          <a:blip r:embed="rId3" cstate="print"/>
+          <a:srcRect/>
+          <a:stretch>
+            <a:fillRect/>
+          </a:stretch>
+        </p:blipFill>
+        <p:spPr bwMode="auto">
+          <a:xfrm>
+            <a:off x="3131840" y="3212976"/>
+            <a:ext cx="1088303" cy="1008112"/>
+          </a:xfrm>
+          <a:prstGeom prst="rect">
+            <a:avLst/>
+          </a:prstGeom>
+          <a:noFill/>
+        </p:spPr>
+      </p:pic>
+      <p:sp>
+        <p:nvSpPr>
+          <p:cNvPr id="29" name="TextBox 28"/>
+          <p:cNvSpPr txBox="1"/>
+          <p:nvPr/>
+        </p:nvSpPr>
+        <p:spPr>
+          <a:xfrm>
+            <a:off x="8440196" y="0"/>
+            <a:ext cx="704104" cy="307777"/>
+          </a:xfrm>
+          <a:prstGeom prst="rect">
+            <a:avLst/>
+          </a:prstGeom>
+          <a:noFill/>
+        </p:spPr>
+        <p:txBody>
+          <a:bodyPr wrap="none" rtlCol="0">
+            <a:spAutoFit/>
+          </a:bodyPr>
+          <a:lstStyle/>
+          <a:p>
+            <a:r>
+              <a:rPr lang="en-US" sz="1400" b="1" dirty="0" smtClean="0"/>
+              <a:t>CLOUD</a:t>
+            </a:r>
+            <a:endParaRPr lang="en-US" sz="1400" b="1" dirty="0"/>
+          </a:p>
+        </p:txBody>
+      </p:sp>
+      <p:pic>
+        <p:nvPicPr>
+          <p:cNvPr id="1029" name="Picture 5" descr="\\global.scd.scania.com\home\Se\046\sssttn\Documents\My Pictures\Server3.png"/>
+          <p:cNvPicPr>
+            <a:picLocks noChangeAspect="1" noChangeArrowheads="1"/>
+          </p:cNvPicPr>
+          <p:nvPr/>
+        </p:nvPicPr>
+        <p:blipFill>
+          <a:blip r:embed="rId4" cstate="print"/>
+          <a:srcRect/>
+          <a:stretch>
+            <a:fillRect/>
+          </a:stretch>
+        </p:blipFill>
+        <p:spPr bwMode="auto">
+          <a:xfrm>
+            <a:off x="7524328" y="3212976"/>
+            <a:ext cx="1088303" cy="1008112"/>
+          </a:xfrm>
+          <a:prstGeom prst="rect">
+            <a:avLst/>
+          </a:prstGeom>
+          <a:noFill/>
+        </p:spPr>
+      </p:pic>
+      <p:pic>
+        <p:nvPicPr>
+          <p:cNvPr id="1026" name="Picture 2" descr="\\global.scd.scania.com\home\Se\046\sssttn\Documents\My Pictures\P4.png"/>
+          <p:cNvPicPr>
+            <a:picLocks noChangeAspect="1" noChangeArrowheads="1"/>
+          </p:cNvPicPr>
+          <p:nvPr/>
+        </p:nvPicPr>
+        <p:blipFill>
+          <a:blip r:embed="rId5" cstate="print"/>
+          <a:srcRect/>
+          <a:stretch>
+            <a:fillRect/>
+          </a:stretch>
+        </p:blipFill>
+        <p:spPr bwMode="auto">
+          <a:xfrm>
+            <a:off x="1043608" y="5013176"/>
+            <a:ext cx="792088" cy="792088"/>
+          </a:xfrm>
+          <a:prstGeom prst="rect">
+            <a:avLst/>
+          </a:prstGeom>
+          <a:noFill/>
+        </p:spPr>
+      </p:pic>
+      <p:pic>
+        <p:nvPicPr>
+          <p:cNvPr id="1034" name="Picture 10" descr="https://addteq.com/images/jenkins_no_bg.png"/>
+          <p:cNvPicPr>
+            <a:picLocks noChangeAspect="1" noChangeArrowheads="1"/>
+          </p:cNvPicPr>
+          <p:nvPr/>
+        </p:nvPicPr>
+        <p:blipFill>
+          <a:blip r:embed="rId6" cstate="print"/>
+          <a:srcRect/>
+          <a:stretch>
+            <a:fillRect/>
+          </a:stretch>
+        </p:blipFill>
+        <p:spPr bwMode="auto">
+          <a:xfrm>
+            <a:off x="3059832" y="2852936"/>
+            <a:ext cx="504943" cy="792088"/>
+          </a:xfrm>
+          <a:prstGeom prst="rect">
+            <a:avLst/>
+          </a:prstGeom>
+          <a:noFill/>
+        </p:spPr>
+      </p:pic>
+      <p:sp>
+        <p:nvSpPr>
+          <p:cNvPr id="40" name="TextBox 39"/>
+          <p:cNvSpPr txBox="1"/>
+          <p:nvPr/>
+        </p:nvSpPr>
+        <p:spPr>
+          <a:xfrm>
+            <a:off x="7668344" y="2780928"/>
+            <a:ext cx="623376" cy="369332"/>
+          </a:xfrm>
+          <a:prstGeom prst="rect">
+            <a:avLst/>
+          </a:prstGeom>
+          <a:noFill/>
+        </p:spPr>
+        <p:txBody>
+          <a:bodyPr wrap="none" rtlCol="0">
+            <a:spAutoFit/>
+          </a:bodyPr>
+          <a:lstStyle/>
+          <a:p>
+            <a:r>
+              <a:rPr lang="sv-SE" dirty="0" err="1" smtClean="0"/>
+              <a:t>Prod</a:t>
+            </a:r>
+            <a:endParaRPr lang="en-GB" dirty="0"/>
+          </a:p>
+        </p:txBody>
+      </p:sp>
+      <p:pic>
+        <p:nvPicPr>
+          <p:cNvPr id="41" name="Picture 5" descr="\\global.scd.scania.com\home\Se\046\sssttn\Documents\My Pictures\Server3.png"/>
+          <p:cNvPicPr>
+            <a:picLocks noChangeAspect="1" noChangeArrowheads="1"/>
+          </p:cNvPicPr>
+          <p:nvPr/>
+        </p:nvPicPr>
+        <p:blipFill>
+          <a:blip r:embed="rId4" cstate="print"/>
+          <a:srcRect/>
+          <a:stretch>
+            <a:fillRect/>
+          </a:stretch>
+        </p:blipFill>
+        <p:spPr bwMode="auto">
+          <a:xfrm>
+            <a:off x="5652120" y="5301208"/>
+            <a:ext cx="1088303" cy="1008112"/>
+          </a:xfrm>
+          <a:prstGeom prst="rect">
+            <a:avLst/>
+          </a:prstGeom>
+          <a:noFill/>
+        </p:spPr>
+      </p:pic>
+      <p:sp>
+        <p:nvSpPr>
+          <p:cNvPr id="42" name="TextBox 41"/>
+          <p:cNvSpPr txBox="1"/>
+          <p:nvPr/>
+        </p:nvSpPr>
+        <p:spPr>
+          <a:xfrm>
+            <a:off x="5868144" y="4931876"/>
+            <a:ext cx="555921" cy="369332"/>
+          </a:xfrm>
+          <a:prstGeom prst="rect">
+            <a:avLst/>
+          </a:prstGeom>
+          <a:noFill/>
+        </p:spPr>
+        <p:txBody>
+          <a:bodyPr wrap="none" rtlCol="0">
+            <a:spAutoFit/>
+          </a:bodyPr>
+          <a:lstStyle/>
+          <a:p>
+            <a:r>
+              <a:rPr lang="sv-SE" dirty="0" smtClean="0"/>
+              <a:t>Test</a:t>
+            </a:r>
+            <a:endParaRPr lang="en-GB" dirty="0"/>
+          </a:p>
+        </p:txBody>
+      </p:sp>
+      <p:cxnSp>
+        <p:nvCxnSpPr>
+          <p:cNvPr id="43" name="Straight Arrow Connector 42"/>
+          <p:cNvCxnSpPr/>
+          <p:nvPr/>
+        </p:nvCxnSpPr>
+        <p:spPr>
+          <a:xfrm>
+            <a:off x="4067944" y="4077072"/>
+            <a:ext cx="1584176" cy="1224136"/>
+          </a:xfrm>
+          <a:prstGeom prst="straightConnector1">
+            <a:avLst/>
+          </a:prstGeom>
+          <a:ln w="28575">
+            <a:tailEnd type="arrow"/>
+          </a:ln>
+        </p:spPr>
+        <p:style>
+          <a:lnRef idx="1">
+            <a:schemeClr val="accent1"/>
+          </a:lnRef>
+          <a:fillRef idx="0">
+            <a:schemeClr val="accent1"/>
+          </a:fillRef>
+          <a:effectRef idx="0">
+            <a:schemeClr val="accent1"/>
+          </a:effectRef>
+          <a:fontRef idx="minor">
+            <a:schemeClr val="tx1"/>
+          </a:fontRef>
+        </p:style>
+      </p:cxnSp>
+      <p:grpSp>
+        <p:nvGrpSpPr>
+          <p:cNvPr id="63" name="Group 62"/>
+          <p:cNvGrpSpPr/>
+          <p:nvPr/>
+        </p:nvGrpSpPr>
+        <p:grpSpPr>
+          <a:xfrm>
+            <a:off x="6300192" y="332656"/>
+            <a:ext cx="1296144" cy="1584176"/>
+            <a:chOff x="6804248" y="404664"/>
+            <a:chExt cx="1296144" cy="1584176"/>
+          </a:xfrm>
+        </p:grpSpPr>
+        <p:pic>
+          <p:nvPicPr>
+            <p:cNvPr id="49" name="Picture 12" descr="http://coderjournal.com/uploads/2013/01/Azure-Websites.png"/>
+            <p:cNvPicPr>
+              <a:picLocks noChangeAspect="1" noChangeArrowheads="1"/>
+            </p:cNvPicPr>
+            <p:nvPr/>
+          </p:nvPicPr>
+          <p:blipFill>
+            <a:blip r:embed="rId7" cstate="print"/>
+            <a:srcRect/>
+            <a:stretch>
+              <a:fillRect/>
+            </a:stretch>
+          </p:blipFill>
+          <p:spPr bwMode="auto">
+            <a:xfrm>
+              <a:off x="6804248" y="404664"/>
+              <a:ext cx="1276350" cy="1581151"/>
+            </a:xfrm>
+            <a:prstGeom prst="rect">
+              <a:avLst/>
+            </a:prstGeom>
+            <a:noFill/>
+          </p:spPr>
+        </p:pic>
+        <p:sp>
+          <p:nvSpPr>
+            <p:cNvPr id="53" name="Rectangle 52"/>
+            <p:cNvSpPr/>
+            <p:nvPr/>
+          </p:nvSpPr>
+          <p:spPr>
+            <a:xfrm>
+              <a:off x="6804248" y="1467640"/>
+              <a:ext cx="1296144" cy="521200"/>
+            </a:xfrm>
+            <a:prstGeom prst="rect">
+              <a:avLst/>
+            </a:prstGeom>
+            <a:solidFill>
+              <a:schemeClr val="bg1"/>
+            </a:solidFill>
+            <a:ln>
+              <a:solidFill>
+                <a:schemeClr val="bg1"/>
+              </a:solidFill>
+            </a:ln>
+          </p:spPr>
+          <p:style>
+            <a:lnRef idx="2">
+              <a:schemeClr val="accent1">
+                <a:shade val="50000"/>
+              </a:schemeClr>
+            </a:lnRef>
+            <a:fillRef idx="1">
+              <a:schemeClr val="accent1"/>
+            </a:fillRef>
+            <a:effectRef idx="0">
+              <a:schemeClr val="accent1"/>
+            </a:effectRef>
+            <a:fontRef idx="minor">
+              <a:schemeClr val="lt1"/>
+            </a:fontRef>
+          </p:style>
+          <p:txBody>
+            <a:bodyPr rtlCol="0" anchor="t"/>
+            <a:lstStyle/>
+            <a:p>
+              <a:pPr algn="ctr"/>
+              <a:r>
+                <a:rPr lang="sv-SE" sz="1400" dirty="0" err="1" smtClean="0">
+                  <a:solidFill>
+                    <a:schemeClr val="tx1"/>
+                  </a:solidFill>
+                </a:rPr>
+                <a:t>Azure</a:t>
+              </a:r>
+              <a:r>
+                <a:rPr lang="sv-SE" sz="1400" dirty="0" smtClean="0">
+                  <a:solidFill>
+                    <a:schemeClr val="tx1"/>
+                  </a:solidFill>
+                </a:rPr>
+                <a:t> Web </a:t>
+              </a:r>
+              <a:r>
+                <a:rPr lang="sv-SE" sz="1400" dirty="0" err="1" smtClean="0">
+                  <a:solidFill>
+                    <a:schemeClr val="tx1"/>
+                  </a:solidFill>
+                </a:rPr>
+                <a:t>site</a:t>
+              </a:r>
+              <a:endParaRPr lang="en-GB" sz="1400" dirty="0">
+                <a:solidFill>
+                  <a:schemeClr val="tx1"/>
+                </a:solidFill>
+              </a:endParaRPr>
+            </a:p>
+          </p:txBody>
+        </p:sp>
+      </p:grpSp>
+      <p:cxnSp>
+        <p:nvCxnSpPr>
+          <p:cNvPr id="55" name="Straight Arrow Connector 54"/>
+          <p:cNvCxnSpPr/>
+          <p:nvPr/>
+        </p:nvCxnSpPr>
+        <p:spPr>
+          <a:xfrm flipV="1">
+            <a:off x="3995936" y="1268760"/>
+            <a:ext cx="2088232" cy="1728192"/>
+          </a:xfrm>
+          <a:prstGeom prst="straightConnector1">
+            <a:avLst/>
+          </a:prstGeom>
+          <a:ln w="28575">
+            <a:solidFill>
+              <a:srgbClr val="FF0000"/>
+            </a:solidFill>
+            <a:tailEnd type="arrow"/>
+          </a:ln>
+        </p:spPr>
+        <p:style>
+          <a:lnRef idx="1">
+            <a:schemeClr val="accent1"/>
+          </a:lnRef>
+          <a:fillRef idx="0">
+            <a:schemeClr val="accent1"/>
+          </a:fillRef>
+          <a:effectRef idx="0">
+            <a:schemeClr val="accent1"/>
+          </a:effectRef>
+          <a:fontRef idx="minor">
+            <a:schemeClr val="tx1"/>
+          </a:fontRef>
+        </p:style>
+      </p:cxnSp>
+      <p:cxnSp>
+        <p:nvCxnSpPr>
+          <p:cNvPr id="67" name="Straight Connector 66"/>
+          <p:cNvCxnSpPr/>
+          <p:nvPr/>
+        </p:nvCxnSpPr>
+        <p:spPr>
+          <a:xfrm>
+            <a:off x="5400600" y="2132856"/>
+            <a:ext cx="3851920" cy="0"/>
+          </a:xfrm>
+          <a:prstGeom prst="line">
+            <a:avLst/>
+          </a:prstGeom>
+        </p:spPr>
+        <p:style>
+          <a:lnRef idx="1">
+            <a:schemeClr val="accent1"/>
+          </a:lnRef>
+          <a:fillRef idx="0">
+            <a:schemeClr val="accent1"/>
+          </a:fillRef>
+          <a:effectRef idx="0">
+            <a:schemeClr val="accent1"/>
+          </a:effectRef>
+          <a:fontRef idx="minor">
+            <a:schemeClr val="tx1"/>
+          </a:fontRef>
+        </p:style>
+      </p:cxnSp>
+      <p:sp>
+        <p:nvSpPr>
+          <p:cNvPr id="69" name="TextBox 68"/>
+          <p:cNvSpPr txBox="1"/>
+          <p:nvPr/>
+        </p:nvSpPr>
+        <p:spPr>
+          <a:xfrm>
+            <a:off x="8566368" y="2132856"/>
+            <a:ext cx="542136" cy="307777"/>
+          </a:xfrm>
+          <a:prstGeom prst="rect">
+            <a:avLst/>
+          </a:prstGeom>
+          <a:noFill/>
+        </p:spPr>
+        <p:txBody>
+          <a:bodyPr wrap="none" rtlCol="0">
+            <a:spAutoFit/>
+          </a:bodyPr>
+          <a:lstStyle/>
+          <a:p>
+            <a:r>
+              <a:rPr lang="en-US" sz="1400" b="1" dirty="0" smtClean="0"/>
+              <a:t>DMZ</a:t>
+            </a:r>
+            <a:endParaRPr lang="en-US" sz="1400" b="1" dirty="0"/>
+          </a:p>
+        </p:txBody>
+      </p:sp>
+      <p:sp>
+        <p:nvSpPr>
+          <p:cNvPr id="73" name="TextBox 72"/>
+          <p:cNvSpPr txBox="1"/>
+          <p:nvPr/>
+        </p:nvSpPr>
+        <p:spPr>
+          <a:xfrm>
+            <a:off x="5266443" y="3356992"/>
+            <a:ext cx="745717" cy="307777"/>
+          </a:xfrm>
+          <a:prstGeom prst="rect">
+            <a:avLst/>
+          </a:prstGeom>
+          <a:noFill/>
+        </p:spPr>
+        <p:txBody>
+          <a:bodyPr wrap="none" rtlCol="0">
+            <a:spAutoFit/>
+          </a:bodyPr>
+          <a:lstStyle/>
+          <a:p>
+            <a:r>
+              <a:rPr lang="sv-SE" sz="1400" b="1" dirty="0" err="1" smtClean="0">
+                <a:solidFill>
+                  <a:srgbClr val="FF0000"/>
+                </a:solidFill>
+              </a:rPr>
+              <a:t>f</a:t>
+            </a:r>
+            <a:r>
+              <a:rPr lang="sv-SE" sz="1400" b="1" dirty="0" err="1" smtClean="0">
+                <a:solidFill>
+                  <a:srgbClr val="FF0000"/>
+                </a:solidFill>
+              </a:rPr>
+              <a:t>irewall</a:t>
+            </a:r>
+            <a:endParaRPr lang="en-GB" sz="1400" b="1" dirty="0">
+              <a:solidFill>
+                <a:srgbClr val="FF0000"/>
+              </a:solidFill>
+            </a:endParaRPr>
+          </a:p>
+        </p:txBody>
+      </p:sp>
+      <p:sp>
+        <p:nvSpPr>
+          <p:cNvPr id="74" name="TextBox 73"/>
+          <p:cNvSpPr txBox="1"/>
+          <p:nvPr/>
+        </p:nvSpPr>
+        <p:spPr>
+          <a:xfrm>
+            <a:off x="4427984" y="1844824"/>
+            <a:ext cx="602088" cy="307777"/>
+          </a:xfrm>
+          <a:prstGeom prst="rect">
+            <a:avLst/>
+          </a:prstGeom>
+          <a:noFill/>
+        </p:spPr>
+        <p:txBody>
+          <a:bodyPr wrap="none" rtlCol="0">
+            <a:spAutoFit/>
+          </a:bodyPr>
+          <a:lstStyle/>
+          <a:p>
+            <a:r>
+              <a:rPr lang="sv-SE" sz="1400" b="1" dirty="0" err="1" smtClean="0">
+                <a:solidFill>
+                  <a:srgbClr val="FF0000"/>
+                </a:solidFill>
+              </a:rPr>
+              <a:t>proxy</a:t>
+            </a:r>
+            <a:endParaRPr lang="en-GB" sz="1400" b="1" dirty="0">
+              <a:solidFill>
+                <a:srgbClr val="FF0000"/>
+              </a:solidFill>
+            </a:endParaRPr>
+          </a:p>
+        </p:txBody>
+      </p:sp>
+    </p:spTree>
+  </p:cSld>
+  <p:clrMapOvr>
+    <a:masterClrMapping/>
+  </p:clrMapOvr>
+  <p:timing>
+    <p:tnLst>
+      <p:par>
+        <p:cTn id="1" dur="indefinite" restart="never" nodeType="tmRoot"/>
+      </p:par>
+    </p:tnLst>
+  </p:timing>
+</p:sld>
+</file>
+
+<file path=ppt/slides/slide5.xml><?xml version="1.0" encoding="utf-8"?>
+<p:sld xmlns:a="http://schemas.openxmlformats.org/drawingml/2006/main" xmlns:r="http://schemas.openxmlformats.org/officeDocument/2006/relationships" xmlns:p="http://schemas.openxmlformats.org/presentationml/2006/main">
+  <p:cSld>
+    <p:spTree>
+      <p:nvGrpSpPr>
+        <p:cNvPr id="1" name=""/>
+        <p:cNvGrpSpPr/>
+        <p:nvPr/>
+      </p:nvGrpSpPr>
+      <p:grpSpPr>
+        <a:xfrm>
+          <a:off x="0" y="0"/>
+          <a:ext cx="0" cy="0"/>
+          <a:chOff x="0" y="0"/>
+          <a:chExt cx="0" cy="0"/>
+        </a:xfrm>
+      </p:grpSpPr>
+      <p:sp>
+        <p:nvSpPr>
+          <p:cNvPr id="27" name="Oval 26"/>
+          <p:cNvSpPr/>
+          <p:nvPr/>
+        </p:nvSpPr>
+        <p:spPr>
+          <a:xfrm>
+            <a:off x="5292080" y="404664"/>
+            <a:ext cx="1296144" cy="720080"/>
+          </a:xfrm>
+          <a:prstGeom prst="ellipse">
+            <a:avLst/>
+          </a:prstGeom>
+          <a:solidFill>
+            <a:schemeClr val="accent2">
+              <a:lumMod val="20000"/>
+              <a:lumOff val="80000"/>
+            </a:schemeClr>
+          </a:solidFill>
+          <a:ln>
+            <a:noFill/>
+          </a:ln>
+        </p:spPr>
+        <p:style>
+          <a:lnRef idx="2">
+            <a:schemeClr val="accent1">
+              <a:shade val="50000"/>
+            </a:schemeClr>
+          </a:lnRef>
+          <a:fillRef idx="1">
+            <a:schemeClr val="accent1"/>
+          </a:fillRef>
+          <a:effectRef idx="0">
+            <a:schemeClr val="accent1"/>
+          </a:effectRef>
+          <a:fontRef idx="minor">
+            <a:schemeClr val="lt1"/>
+          </a:fontRef>
+        </p:style>
+        <p:txBody>
+          <a:bodyPr rtlCol="0" anchor="ctr"/>
+          <a:lstStyle/>
+          <a:p>
+            <a:pPr algn="ctr"/>
+            <a:endParaRPr lang="en-GB"/>
+          </a:p>
+        </p:txBody>
+      </p:sp>
       <p:pic>
         <p:nvPicPr>
           <p:cNvPr id="1027" name="Picture 3"/>
@@ -3564,8 +6239,8 @@
         </p:nvSpPr>
         <p:spPr>
           <a:xfrm>
-            <a:off x="467544" y="3861048"/>
-            <a:ext cx="1057918" cy="307777"/>
+            <a:off x="683568" y="3789040"/>
+            <a:ext cx="686406" cy="307777"/>
           </a:xfrm>
           <a:prstGeom prst="rect">
             <a:avLst/>
@@ -3580,7 +6255,7 @@
           <a:p>
             <a:r>
               <a:rPr lang="en-US" sz="1400" b="1" dirty="0" smtClean="0"/>
-              <a:t>On-premise</a:t>
+              <a:t>INSIDE</a:t>
             </a:r>
             <a:endParaRPr lang="en-US" sz="1400" b="1" dirty="0"/>
           </a:p>
@@ -3985,7 +6660,7 @@
         </p:blipFill>
         <p:spPr bwMode="auto">
           <a:xfrm>
-            <a:off x="7092280" y="657200"/>
+            <a:off x="7164288" y="657200"/>
             <a:ext cx="1276350" cy="1581151"/>
           </a:xfrm>
           <a:prstGeom prst="rect">
@@ -4002,7 +6677,7 @@
         </p:nvSpPr>
         <p:spPr>
           <a:xfrm>
-            <a:off x="7092280" y="1720176"/>
+            <a:off x="7164288" y="1720176"/>
             <a:ext cx="1296144" cy="521200"/>
           </a:xfrm>
           <a:prstGeom prst="rect">
@@ -4078,7 +6753,7 @@
         </p:nvSpPr>
         <p:spPr>
           <a:xfrm>
-            <a:off x="5940152" y="585192"/>
+            <a:off x="5994919" y="585192"/>
             <a:ext cx="521297" cy="369332"/>
           </a:xfrm>
           <a:prstGeom prst="rect">
@@ -4093,10 +6768,18 @@
           <a:lstStyle/>
           <a:p>
             <a:r>
-              <a:rPr lang="sv-SE" dirty="0" smtClean="0"/>
+              <a:rPr lang="sv-SE" dirty="0" smtClean="0">
+                <a:solidFill>
+                  <a:srgbClr val="FF0000"/>
+                </a:solidFill>
+              </a:rPr>
               <a:t>FTP</a:t>
             </a:r>
-            <a:endParaRPr lang="en-GB" dirty="0"/>
+            <a:endParaRPr lang="en-GB" dirty="0">
+              <a:solidFill>
+                <a:srgbClr val="FF0000"/>
+              </a:solidFill>
+            </a:endParaRPr>
           </a:p>
         </p:txBody>
       </p:sp>
@@ -4134,7 +6817,7 @@
         </p:nvSpPr>
         <p:spPr>
           <a:xfrm>
-            <a:off x="6567424" y="2025352"/>
+            <a:off x="6639432" y="2025352"/>
             <a:ext cx="2541080" cy="430887"/>
           </a:xfrm>
           <a:prstGeom prst="rect">
@@ -4213,7 +6896,7 @@
         </p:blipFill>
         <p:spPr bwMode="auto">
           <a:xfrm>
-            <a:off x="7113080" y="3430161"/>
+            <a:off x="7185088" y="3430161"/>
             <a:ext cx="1276350" cy="1581151"/>
           </a:xfrm>
           <a:prstGeom prst="rect">
@@ -4230,7 +6913,7 @@
         </p:nvSpPr>
         <p:spPr>
           <a:xfrm>
-            <a:off x="7113080" y="4493137"/>
+            <a:off x="7185088" y="4493137"/>
             <a:ext cx="1296144" cy="521200"/>
           </a:xfrm>
           <a:prstGeom prst="rect">
@@ -4306,7 +6989,7 @@
         </p:nvSpPr>
         <p:spPr>
           <a:xfrm>
-            <a:off x="6685203" y="4798313"/>
+            <a:off x="6757211" y="4798313"/>
             <a:ext cx="2347117" cy="430887"/>
           </a:xfrm>
           <a:prstGeom prst="rect">
@@ -4374,6 +7057,36 @@
               <a:t>webhook</a:t>
             </a:r>
             <a:endParaRPr lang="en-GB" sz="1200" dirty="0"/>
+          </a:p>
+        </p:txBody>
+      </p:sp>
+      <p:sp>
+        <p:nvSpPr>
+          <p:cNvPr id="26" name="TextBox 25"/>
+          <p:cNvSpPr txBox="1"/>
+          <p:nvPr/>
+        </p:nvSpPr>
+        <p:spPr>
+          <a:xfrm>
+            <a:off x="8440196" y="0"/>
+            <a:ext cx="704104" cy="307777"/>
+          </a:xfrm>
+          <a:prstGeom prst="rect">
+            <a:avLst/>
+          </a:prstGeom>
+          <a:noFill/>
+        </p:spPr>
+        <p:txBody>
+          <a:bodyPr wrap="none" rtlCol="0">
+            <a:spAutoFit/>
+          </a:bodyPr>
+          <a:lstStyle/>
+          <a:p>
+            <a:r>
+              <a:rPr lang="en-US" sz="1400" b="1" dirty="0" smtClean="0"/>
+              <a:t>CLOUD</a:t>
+            </a:r>
+            <a:endParaRPr lang="en-US" sz="1400" b="1" dirty="0"/>
           </a:p>
         </p:txBody>
       </p:sp>
@@ -4392,7 +7105,7 @@
 </p:sld>
 </file>
 
-<file path=ppt/slides/slide4.xml><?xml version="1.0" encoding="utf-8"?>
+<file path=ppt/slides/slide6.xml><?xml version="1.0" encoding="utf-8"?>
 <p:sld xmlns:a="http://schemas.openxmlformats.org/drawingml/2006/main" xmlns:r="http://schemas.openxmlformats.org/officeDocument/2006/relationships" xmlns:p="http://schemas.openxmlformats.org/presentationml/2006/main">
   <p:cSld>
     <p:spTree>
@@ -4426,15 +7139,11 @@
           <a:p>
             <a:r>
               <a:rPr lang="en-US" smtClean="0"/>
-              <a:t>Why</a:t>
+              <a:t>Why CWP as Open </a:t>
             </a:r>
             <a:r>
               <a:rPr lang="en-US" smtClean="0"/>
-              <a:t> CWP as Open </a:t>
-            </a:r>
-            <a:r>
-              <a:rPr lang="en-US" smtClean="0"/>
-              <a:t>Source</a:t>
+              <a:t>Source?</a:t>
             </a:r>
             <a:endParaRPr lang="en-US"/>
           </a:p>
@@ -4478,7 +7187,15 @@
             <a:pPr lvl="1"/>
             <a:r>
               <a:rPr lang="en-US" dirty="0" smtClean="0"/>
-              <a:t>”Open Source tend to have more quality”</a:t>
+              <a:t>”Open Source </a:t>
+            </a:r>
+            <a:r>
+              <a:rPr lang="en-US" dirty="0" smtClean="0"/>
+              <a:t>code tend </a:t>
+            </a:r>
+            <a:r>
+              <a:rPr lang="en-US" dirty="0" smtClean="0"/>
+              <a:t>to have more quality”</a:t>
             </a:r>
           </a:p>
           <a:p>
@@ -4489,6 +7206,13 @@
             <a:r>
               <a:rPr lang="en-US" dirty="0" err="1" smtClean="0"/>
               <a:t>Git</a:t>
+            </a:r>
+            <a:endParaRPr lang="en-US" dirty="0" smtClean="0"/>
+          </a:p>
+          <a:p>
+            <a:r>
+              <a:rPr lang="en-US" dirty="0" smtClean="0"/>
+              <a:t>Customer can fork codebase and do own customizations</a:t>
             </a:r>
             <a:endParaRPr lang="en-US" dirty="0"/>
           </a:p>

</xml_diff>